<commit_message>
added lecture 2 csvs
</commit_message>
<xml_diff>
--- a/IntroProg_1+2.pptx
+++ b/IntroProg_1+2.pptx
@@ -5,7 +5,7 @@
     <p:sldMasterId id="2147483648" r:id="rId1"/>
   </p:sldMasterIdLst>
   <p:notesMasterIdLst>
-    <p:notesMasterId r:id="rId25"/>
+    <p:notesMasterId r:id="rId24"/>
   </p:notesMasterIdLst>
   <p:sldIdLst>
     <p:sldId id="256" r:id="rId2"/>
@@ -14,23 +14,22 @@
     <p:sldId id="262" r:id="rId5"/>
     <p:sldId id="281" r:id="rId6"/>
     <p:sldId id="263" r:id="rId7"/>
-    <p:sldId id="282" r:id="rId8"/>
-    <p:sldId id="264" r:id="rId9"/>
-    <p:sldId id="265" r:id="rId10"/>
-    <p:sldId id="266" r:id="rId11"/>
-    <p:sldId id="269" r:id="rId12"/>
-    <p:sldId id="267" r:id="rId13"/>
-    <p:sldId id="268" r:id="rId14"/>
-    <p:sldId id="258" r:id="rId15"/>
-    <p:sldId id="271" r:id="rId16"/>
-    <p:sldId id="270" r:id="rId17"/>
-    <p:sldId id="273" r:id="rId18"/>
-    <p:sldId id="277" r:id="rId19"/>
-    <p:sldId id="278" r:id="rId20"/>
-    <p:sldId id="279" r:id="rId21"/>
-    <p:sldId id="276" r:id="rId22"/>
-    <p:sldId id="272" r:id="rId23"/>
-    <p:sldId id="274" r:id="rId24"/>
+    <p:sldId id="264" r:id="rId8"/>
+    <p:sldId id="265" r:id="rId9"/>
+    <p:sldId id="266" r:id="rId10"/>
+    <p:sldId id="269" r:id="rId11"/>
+    <p:sldId id="267" r:id="rId12"/>
+    <p:sldId id="268" r:id="rId13"/>
+    <p:sldId id="258" r:id="rId14"/>
+    <p:sldId id="271" r:id="rId15"/>
+    <p:sldId id="270" r:id="rId16"/>
+    <p:sldId id="273" r:id="rId17"/>
+    <p:sldId id="277" r:id="rId18"/>
+    <p:sldId id="278" r:id="rId19"/>
+    <p:sldId id="279" r:id="rId20"/>
+    <p:sldId id="276" r:id="rId21"/>
+    <p:sldId id="272" r:id="rId22"/>
+    <p:sldId id="274" r:id="rId23"/>
   </p:sldIdLst>
   <p:sldSz cx="12192000" cy="6858000"/>
   <p:notesSz cx="6858000" cy="9144000"/>
@@ -947,7 +946,7 @@
           <a:p>
             <a:fld id="{D1B5E806-7C49-B844-86C7-027205F85293}" type="datetimeFigureOut">
               <a:rPr lang="en-US" smtClean="0"/>
-              <a:t>5/22/24</a:t>
+              <a:t>5/24/24</a:t>
             </a:fld>
             <a:endParaRPr lang="en-US"/>
           </a:p>
@@ -1630,14 +1629,22 @@
             </a:r>
           </a:p>
           <a:p>
-            <a:endParaRPr lang="en-US" dirty="0">
-              <a:hlinkClick r:id="rId3"/>
-            </a:endParaRPr>
-          </a:p>
-          <a:p>
-            <a:endParaRPr lang="en-US" dirty="0">
-              <a:hlinkClick r:id="rId3"/>
-            </a:endParaRPr>
+            <a:endParaRPr lang="en-US" dirty="0"/>
+          </a:p>
+          <a:p>
+            <a:endParaRPr lang="en-US" dirty="0"/>
+          </a:p>
+          <a:p>
+            <a:r>
+              <a:rPr lang="en-US" dirty="0"/>
+              <a:t>Python --&gt; programming language</a:t>
+            </a:r>
+          </a:p>
+          <a:p>
+            <a:r>
+              <a:rPr lang="en-US" dirty="0"/>
+              <a:t>then discuss different possible languages, pros and cons of python.</a:t>
+            </a:r>
           </a:p>
           <a:p>
             <a:endParaRPr lang="en-US" dirty="0">
@@ -1691,6 +1698,490 @@
     <p:extLst>
       <p:ext uri="{BB962C8B-B14F-4D97-AF65-F5344CB8AC3E}">
         <p14:creationId xmlns:p14="http://schemas.microsoft.com/office/powerpoint/2010/main" val="1025847342"/>
+      </p:ext>
+    </p:extLst>
+  </p:cSld>
+  <p:clrMapOvr>
+    <a:masterClrMapping/>
+  </p:clrMapOvr>
+</p:notes>
+</file>
+
+<file path=ppt/notesSlides/notesSlide5.xml><?xml version="1.0" encoding="utf-8"?>
+<p:notes xmlns:a="http://schemas.openxmlformats.org/drawingml/2006/main" xmlns:r="http://schemas.openxmlformats.org/officeDocument/2006/relationships" xmlns:p="http://schemas.openxmlformats.org/presentationml/2006/main">
+  <p:cSld>
+    <p:spTree>
+      <p:nvGrpSpPr>
+        <p:cNvPr id="1" name=""/>
+        <p:cNvGrpSpPr/>
+        <p:nvPr/>
+      </p:nvGrpSpPr>
+      <p:grpSpPr>
+        <a:xfrm>
+          <a:off x="0" y="0"/>
+          <a:ext cx="0" cy="0"/>
+          <a:chOff x="0" y="0"/>
+          <a:chExt cx="0" cy="0"/>
+        </a:xfrm>
+      </p:grpSpPr>
+      <p:sp>
+        <p:nvSpPr>
+          <p:cNvPr id="2" name="Slide Image Placeholder 1"/>
+          <p:cNvSpPr>
+            <a:spLocks noGrp="1" noRot="1" noChangeAspect="1"/>
+          </p:cNvSpPr>
+          <p:nvPr>
+            <p:ph type="sldImg"/>
+          </p:nvPr>
+        </p:nvSpPr>
+        <p:spPr/>
+      </p:sp>
+      <p:sp>
+        <p:nvSpPr>
+          <p:cNvPr id="3" name="Notes Placeholder 2"/>
+          <p:cNvSpPr>
+            <a:spLocks noGrp="1"/>
+          </p:cNvSpPr>
+          <p:nvPr>
+            <p:ph type="body" idx="1"/>
+          </p:nvPr>
+        </p:nvSpPr>
+        <p:spPr/>
+        <p:txBody>
+          <a:bodyPr/>
+          <a:lstStyle/>
+          <a:p>
+            <a:pPr marL="0" marR="0" lvl="0" indent="0" algn="l" defTabSz="914400" rtl="0" eaLnBrk="1" fontAlgn="auto" latinLnBrk="0" hangingPunct="1">
+              <a:lnSpc>
+                <a:spcPct val="100000"/>
+              </a:lnSpc>
+              <a:spcBef>
+                <a:spcPts val="0"/>
+              </a:spcBef>
+              <a:spcAft>
+                <a:spcPts val="0"/>
+              </a:spcAft>
+              <a:buClrTx/>
+              <a:buSzTx/>
+              <a:buFontTx/>
+              <a:buNone/>
+              <a:tabLst/>
+              <a:defRPr/>
+            </a:pPr>
+            <a:r>
+              <a:rPr lang="en-US" dirty="0"/>
+              <a:t>This is too much information, show these things 1 by 1</a:t>
+            </a:r>
+          </a:p>
+          <a:p>
+            <a:endParaRPr lang="en-US" dirty="0"/>
+          </a:p>
+          <a:p>
+            <a:r>
+              <a:rPr lang="en-US" dirty="0"/>
+              <a:t>Show math notation (</a:t>
+            </a:r>
+            <a:r>
+              <a:rPr lang="en-US" dirty="0" err="1"/>
+              <a:t>Latec</a:t>
+            </a:r>
+            <a:r>
+              <a:rPr lang="en-US" dirty="0"/>
+              <a:t>), then show the python version</a:t>
+            </a:r>
+          </a:p>
+          <a:p>
+            <a:r>
+              <a:rPr lang="en-US" dirty="0"/>
+              <a:t>1 slide and 1 </a:t>
+            </a:r>
+            <a:r>
+              <a:rPr lang="en-US" dirty="0" err="1"/>
+              <a:t>CoLab</a:t>
+            </a:r>
+            <a:r>
+              <a:rPr lang="en-US" dirty="0"/>
+              <a:t> cell per new operation</a:t>
+            </a:r>
+          </a:p>
+          <a:p>
+            <a:endParaRPr lang="en-US" dirty="0"/>
+          </a:p>
+          <a:p>
+            <a:r>
+              <a:rPr lang="en-US" dirty="0"/>
+              <a:t>Variable type --&gt; Operation on variable</a:t>
+            </a:r>
+          </a:p>
+          <a:p>
+            <a:endParaRPr lang="en-US" dirty="0"/>
+          </a:p>
+          <a:p>
+            <a:r>
+              <a:rPr lang="en-US" dirty="0"/>
+              <a:t>PEMDAS</a:t>
+            </a:r>
+          </a:p>
+          <a:p>
+            <a:r>
+              <a:rPr lang="en-US" dirty="0"/>
+              <a:t>string addition + multiplication</a:t>
+            </a:r>
+          </a:p>
+          <a:p>
+            <a:r>
+              <a:rPr lang="en-US" dirty="0"/>
+              <a:t>Booleans --&gt; Logical statements --&gt; "show the logic table"</a:t>
+            </a:r>
+          </a:p>
+          <a:p>
+            <a:r>
+              <a:rPr lang="en-US" dirty="0"/>
+              <a:t>==</a:t>
+            </a:r>
+          </a:p>
+        </p:txBody>
+      </p:sp>
+      <p:sp>
+        <p:nvSpPr>
+          <p:cNvPr id="4" name="Slide Number Placeholder 3"/>
+          <p:cNvSpPr>
+            <a:spLocks noGrp="1"/>
+          </p:cNvSpPr>
+          <p:nvPr>
+            <p:ph type="sldNum" sz="quarter" idx="5"/>
+          </p:nvPr>
+        </p:nvSpPr>
+        <p:spPr/>
+        <p:txBody>
+          <a:bodyPr/>
+          <a:lstStyle/>
+          <a:p>
+            <a:fld id="{E63DD1E8-63F1-A343-A094-4032FF285435}" type="slidenum">
+              <a:rPr lang="en-US" smtClean="0"/>
+              <a:t>8</a:t>
+            </a:fld>
+            <a:endParaRPr lang="en-US"/>
+          </a:p>
+        </p:txBody>
+      </p:sp>
+    </p:spTree>
+    <p:extLst>
+      <p:ext uri="{BB962C8B-B14F-4D97-AF65-F5344CB8AC3E}">
+        <p14:creationId xmlns:p14="http://schemas.microsoft.com/office/powerpoint/2010/main" val="3090562343"/>
+      </p:ext>
+    </p:extLst>
+  </p:cSld>
+  <p:clrMapOvr>
+    <a:masterClrMapping/>
+  </p:clrMapOvr>
+</p:notes>
+</file>
+
+<file path=ppt/notesSlides/notesSlide6.xml><?xml version="1.0" encoding="utf-8"?>
+<p:notes xmlns:a="http://schemas.openxmlformats.org/drawingml/2006/main" xmlns:r="http://schemas.openxmlformats.org/officeDocument/2006/relationships" xmlns:p="http://schemas.openxmlformats.org/presentationml/2006/main">
+  <p:cSld>
+    <p:spTree>
+      <p:nvGrpSpPr>
+        <p:cNvPr id="1" name=""/>
+        <p:cNvGrpSpPr/>
+        <p:nvPr/>
+      </p:nvGrpSpPr>
+      <p:grpSpPr>
+        <a:xfrm>
+          <a:off x="0" y="0"/>
+          <a:ext cx="0" cy="0"/>
+          <a:chOff x="0" y="0"/>
+          <a:chExt cx="0" cy="0"/>
+        </a:xfrm>
+      </p:grpSpPr>
+      <p:sp>
+        <p:nvSpPr>
+          <p:cNvPr id="2" name="Slide Image Placeholder 1"/>
+          <p:cNvSpPr>
+            <a:spLocks noGrp="1" noRot="1" noChangeAspect="1"/>
+          </p:cNvSpPr>
+          <p:nvPr>
+            <p:ph type="sldImg"/>
+          </p:nvPr>
+        </p:nvSpPr>
+        <p:spPr/>
+      </p:sp>
+      <p:sp>
+        <p:nvSpPr>
+          <p:cNvPr id="3" name="Notes Placeholder 2"/>
+          <p:cNvSpPr>
+            <a:spLocks noGrp="1"/>
+          </p:cNvSpPr>
+          <p:nvPr>
+            <p:ph type="body" idx="1"/>
+          </p:nvPr>
+        </p:nvSpPr>
+        <p:spPr/>
+        <p:txBody>
+          <a:bodyPr/>
+          <a:lstStyle/>
+          <a:p>
+            <a:r>
+              <a:rPr lang="en-US" dirty="0"/>
+              <a:t>start with a simpler function</a:t>
+            </a:r>
+          </a:p>
+          <a:p>
+            <a:r>
+              <a:rPr lang="en-US" dirty="0"/>
+              <a:t>def </a:t>
+            </a:r>
+            <a:r>
+              <a:rPr lang="en-US" dirty="0" err="1"/>
+              <a:t>function_name</a:t>
+            </a:r>
+            <a:r>
+              <a:rPr lang="en-US" dirty="0"/>
+              <a:t>():</a:t>
+            </a:r>
+          </a:p>
+          <a:p>
+            <a:r>
+              <a:rPr lang="en-US" dirty="0"/>
+              <a:t>	print("The function just ran!")</a:t>
+            </a:r>
+          </a:p>
+        </p:txBody>
+      </p:sp>
+      <p:sp>
+        <p:nvSpPr>
+          <p:cNvPr id="4" name="Slide Number Placeholder 3"/>
+          <p:cNvSpPr>
+            <a:spLocks noGrp="1"/>
+          </p:cNvSpPr>
+          <p:nvPr>
+            <p:ph type="sldNum" sz="quarter" idx="5"/>
+          </p:nvPr>
+        </p:nvSpPr>
+        <p:spPr/>
+        <p:txBody>
+          <a:bodyPr/>
+          <a:lstStyle/>
+          <a:p>
+            <a:fld id="{E63DD1E8-63F1-A343-A094-4032FF285435}" type="slidenum">
+              <a:rPr lang="en-US" smtClean="0"/>
+              <a:t>9</a:t>
+            </a:fld>
+            <a:endParaRPr lang="en-US"/>
+          </a:p>
+        </p:txBody>
+      </p:sp>
+    </p:spTree>
+    <p:extLst>
+      <p:ext uri="{BB962C8B-B14F-4D97-AF65-F5344CB8AC3E}">
+        <p14:creationId xmlns:p14="http://schemas.microsoft.com/office/powerpoint/2010/main" val="1295236605"/>
+      </p:ext>
+    </p:extLst>
+  </p:cSld>
+  <p:clrMapOvr>
+    <a:masterClrMapping/>
+  </p:clrMapOvr>
+</p:notes>
+</file>
+
+<file path=ppt/notesSlides/notesSlide7.xml><?xml version="1.0" encoding="utf-8"?>
+<p:notes xmlns:a="http://schemas.openxmlformats.org/drawingml/2006/main" xmlns:r="http://schemas.openxmlformats.org/officeDocument/2006/relationships" xmlns:p="http://schemas.openxmlformats.org/presentationml/2006/main">
+  <p:cSld>
+    <p:spTree>
+      <p:nvGrpSpPr>
+        <p:cNvPr id="1" name=""/>
+        <p:cNvGrpSpPr/>
+        <p:nvPr/>
+      </p:nvGrpSpPr>
+      <p:grpSpPr>
+        <a:xfrm>
+          <a:off x="0" y="0"/>
+          <a:ext cx="0" cy="0"/>
+          <a:chOff x="0" y="0"/>
+          <a:chExt cx="0" cy="0"/>
+        </a:xfrm>
+      </p:grpSpPr>
+      <p:sp>
+        <p:nvSpPr>
+          <p:cNvPr id="2" name="Slide Image Placeholder 1"/>
+          <p:cNvSpPr>
+            <a:spLocks noGrp="1" noRot="1" noChangeAspect="1"/>
+          </p:cNvSpPr>
+          <p:nvPr>
+            <p:ph type="sldImg"/>
+          </p:nvPr>
+        </p:nvSpPr>
+        <p:spPr/>
+      </p:sp>
+      <p:sp>
+        <p:nvSpPr>
+          <p:cNvPr id="3" name="Notes Placeholder 2"/>
+          <p:cNvSpPr>
+            <a:spLocks noGrp="1"/>
+          </p:cNvSpPr>
+          <p:nvPr>
+            <p:ph type="body" idx="1"/>
+          </p:nvPr>
+        </p:nvSpPr>
+        <p:spPr/>
+        <p:txBody>
+          <a:bodyPr/>
+          <a:lstStyle/>
+          <a:p>
+            <a:r>
+              <a:rPr lang="en-US" dirty="0"/>
+              <a:t>import math</a:t>
+            </a:r>
+          </a:p>
+          <a:p>
+            <a:endParaRPr lang="en-US" dirty="0"/>
+          </a:p>
+          <a:p>
+            <a:r>
+              <a:rPr lang="en-US" dirty="0"/>
+              <a:t>if you just want one thing:</a:t>
+            </a:r>
+          </a:p>
+          <a:p>
+            <a:r>
+              <a:rPr lang="en-US" dirty="0"/>
+              <a:t>from math import pi</a:t>
+            </a:r>
+          </a:p>
+          <a:p>
+            <a:endParaRPr lang="en-US" dirty="0"/>
+          </a:p>
+          <a:p>
+            <a:r>
+              <a:rPr lang="en-US" dirty="0"/>
+              <a:t>get the </a:t>
+            </a:r>
+            <a:r>
+              <a:rPr lang="en-US" dirty="0" err="1"/>
+              <a:t>cosin</a:t>
+            </a:r>
+            <a:r>
+              <a:rPr lang="en-US" dirty="0"/>
+              <a:t> function and use it:</a:t>
+            </a:r>
+          </a:p>
+        </p:txBody>
+      </p:sp>
+      <p:sp>
+        <p:nvSpPr>
+          <p:cNvPr id="4" name="Slide Number Placeholder 3"/>
+          <p:cNvSpPr>
+            <a:spLocks noGrp="1"/>
+          </p:cNvSpPr>
+          <p:nvPr>
+            <p:ph type="sldNum" sz="quarter" idx="5"/>
+          </p:nvPr>
+        </p:nvSpPr>
+        <p:spPr/>
+        <p:txBody>
+          <a:bodyPr/>
+          <a:lstStyle/>
+          <a:p>
+            <a:fld id="{E63DD1E8-63F1-A343-A094-4032FF285435}" type="slidenum">
+              <a:rPr lang="en-US" smtClean="0"/>
+              <a:t>11</a:t>
+            </a:fld>
+            <a:endParaRPr lang="en-US"/>
+          </a:p>
+        </p:txBody>
+      </p:sp>
+    </p:spTree>
+    <p:extLst>
+      <p:ext uri="{BB962C8B-B14F-4D97-AF65-F5344CB8AC3E}">
+        <p14:creationId xmlns:p14="http://schemas.microsoft.com/office/powerpoint/2010/main" val="766989914"/>
+      </p:ext>
+    </p:extLst>
+  </p:cSld>
+  <p:clrMapOvr>
+    <a:masterClrMapping/>
+  </p:clrMapOvr>
+</p:notes>
+</file>
+
+<file path=ppt/notesSlides/notesSlide8.xml><?xml version="1.0" encoding="utf-8"?>
+<p:notes xmlns:a="http://schemas.openxmlformats.org/drawingml/2006/main" xmlns:r="http://schemas.openxmlformats.org/officeDocument/2006/relationships" xmlns:p="http://schemas.openxmlformats.org/presentationml/2006/main">
+  <p:cSld>
+    <p:spTree>
+      <p:nvGrpSpPr>
+        <p:cNvPr id="1" name=""/>
+        <p:cNvGrpSpPr/>
+        <p:nvPr/>
+      </p:nvGrpSpPr>
+      <p:grpSpPr>
+        <a:xfrm>
+          <a:off x="0" y="0"/>
+          <a:ext cx="0" cy="0"/>
+          <a:chOff x="0" y="0"/>
+          <a:chExt cx="0" cy="0"/>
+        </a:xfrm>
+      </p:grpSpPr>
+      <p:sp>
+        <p:nvSpPr>
+          <p:cNvPr id="2" name="Slide Image Placeholder 1"/>
+          <p:cNvSpPr>
+            <a:spLocks noGrp="1" noRot="1" noChangeAspect="1"/>
+          </p:cNvSpPr>
+          <p:nvPr>
+            <p:ph type="sldImg"/>
+          </p:nvPr>
+        </p:nvSpPr>
+        <p:spPr/>
+      </p:sp>
+      <p:sp>
+        <p:nvSpPr>
+          <p:cNvPr id="3" name="Notes Placeholder 2"/>
+          <p:cNvSpPr>
+            <a:spLocks noGrp="1"/>
+          </p:cNvSpPr>
+          <p:nvPr>
+            <p:ph type="body" idx="1"/>
+          </p:nvPr>
+        </p:nvSpPr>
+        <p:spPr/>
+        <p:txBody>
+          <a:bodyPr/>
+          <a:lstStyle/>
+          <a:p>
+            <a:r>
+              <a:rPr lang="en-US" dirty="0"/>
+              <a:t>from time import sleep to make the turtle go slower</a:t>
+            </a:r>
+          </a:p>
+        </p:txBody>
+      </p:sp>
+      <p:sp>
+        <p:nvSpPr>
+          <p:cNvPr id="4" name="Slide Number Placeholder 3"/>
+          <p:cNvSpPr>
+            <a:spLocks noGrp="1"/>
+          </p:cNvSpPr>
+          <p:nvPr>
+            <p:ph type="sldNum" sz="quarter" idx="5"/>
+          </p:nvPr>
+        </p:nvSpPr>
+        <p:spPr/>
+        <p:txBody>
+          <a:bodyPr/>
+          <a:lstStyle/>
+          <a:p>
+            <a:fld id="{E63DD1E8-63F1-A343-A094-4032FF285435}" type="slidenum">
+              <a:rPr lang="en-US" smtClean="0"/>
+              <a:t>12</a:t>
+            </a:fld>
+            <a:endParaRPr lang="en-US"/>
+          </a:p>
+        </p:txBody>
+      </p:sp>
+    </p:spTree>
+    <p:extLst>
+      <p:ext uri="{BB962C8B-B14F-4D97-AF65-F5344CB8AC3E}">
+        <p14:creationId xmlns:p14="http://schemas.microsoft.com/office/powerpoint/2010/main" val="2150318460"/>
       </p:ext>
     </p:extLst>
   </p:cSld>
@@ -1847,7 +2338,7 @@
           <a:p>
             <a:fld id="{43AD5F69-6ABA-2F4A-A893-539509823620}" type="datetimeFigureOut">
               <a:rPr lang="en-US" smtClean="0"/>
-              <a:t>5/21/24</a:t>
+              <a:t>5/24/24</a:t>
             </a:fld>
             <a:endParaRPr lang="en-US"/>
           </a:p>
@@ -2045,7 +2536,7 @@
           <a:p>
             <a:fld id="{43AD5F69-6ABA-2F4A-A893-539509823620}" type="datetimeFigureOut">
               <a:rPr lang="en-US" smtClean="0"/>
-              <a:t>5/21/24</a:t>
+              <a:t>5/24/24</a:t>
             </a:fld>
             <a:endParaRPr lang="en-US"/>
           </a:p>
@@ -2253,7 +2744,7 @@
           <a:p>
             <a:fld id="{43AD5F69-6ABA-2F4A-A893-539509823620}" type="datetimeFigureOut">
               <a:rPr lang="en-US" smtClean="0"/>
-              <a:t>5/21/24</a:t>
+              <a:t>5/24/24</a:t>
             </a:fld>
             <a:endParaRPr lang="en-US"/>
           </a:p>
@@ -2451,7 +2942,7 @@
           <a:p>
             <a:fld id="{43AD5F69-6ABA-2F4A-A893-539509823620}" type="datetimeFigureOut">
               <a:rPr lang="en-US" smtClean="0"/>
-              <a:t>5/21/24</a:t>
+              <a:t>5/24/24</a:t>
             </a:fld>
             <a:endParaRPr lang="en-US"/>
           </a:p>
@@ -2726,7 +3217,7 @@
           <a:p>
             <a:fld id="{43AD5F69-6ABA-2F4A-A893-539509823620}" type="datetimeFigureOut">
               <a:rPr lang="en-US" smtClean="0"/>
-              <a:t>5/21/24</a:t>
+              <a:t>5/24/24</a:t>
             </a:fld>
             <a:endParaRPr lang="en-US"/>
           </a:p>
@@ -2991,7 +3482,7 @@
           <a:p>
             <a:fld id="{43AD5F69-6ABA-2F4A-A893-539509823620}" type="datetimeFigureOut">
               <a:rPr lang="en-US" smtClean="0"/>
-              <a:t>5/21/24</a:t>
+              <a:t>5/24/24</a:t>
             </a:fld>
             <a:endParaRPr lang="en-US"/>
           </a:p>
@@ -3403,7 +3894,7 @@
           <a:p>
             <a:fld id="{43AD5F69-6ABA-2F4A-A893-539509823620}" type="datetimeFigureOut">
               <a:rPr lang="en-US" smtClean="0"/>
-              <a:t>5/21/24</a:t>
+              <a:t>5/24/24</a:t>
             </a:fld>
             <a:endParaRPr lang="en-US"/>
           </a:p>
@@ -3544,7 +4035,7 @@
           <a:p>
             <a:fld id="{43AD5F69-6ABA-2F4A-A893-539509823620}" type="datetimeFigureOut">
               <a:rPr lang="en-US" smtClean="0"/>
-              <a:t>5/21/24</a:t>
+              <a:t>5/24/24</a:t>
             </a:fld>
             <a:endParaRPr lang="en-US"/>
           </a:p>
@@ -3657,7 +4148,7 @@
           <a:p>
             <a:fld id="{43AD5F69-6ABA-2F4A-A893-539509823620}" type="datetimeFigureOut">
               <a:rPr lang="en-US" smtClean="0"/>
-              <a:t>5/21/24</a:t>
+              <a:t>5/24/24</a:t>
             </a:fld>
             <a:endParaRPr lang="en-US"/>
           </a:p>
@@ -3968,7 +4459,7 @@
           <a:p>
             <a:fld id="{43AD5F69-6ABA-2F4A-A893-539509823620}" type="datetimeFigureOut">
               <a:rPr lang="en-US" smtClean="0"/>
-              <a:t>5/21/24</a:t>
+              <a:t>5/24/24</a:t>
             </a:fld>
             <a:endParaRPr lang="en-US"/>
           </a:p>
@@ -4256,7 +4747,7 @@
           <a:p>
             <a:fld id="{43AD5F69-6ABA-2F4A-A893-539509823620}" type="datetimeFigureOut">
               <a:rPr lang="en-US" smtClean="0"/>
-              <a:t>5/21/24</a:t>
+              <a:t>5/24/24</a:t>
             </a:fld>
             <a:endParaRPr lang="en-US"/>
           </a:p>
@@ -4497,7 +4988,7 @@
           <a:p>
             <a:fld id="{43AD5F69-6ABA-2F4A-A893-539509823620}" type="datetimeFigureOut">
               <a:rPr lang="en-US" smtClean="0"/>
-              <a:t>5/21/24</a:t>
+              <a:t>5/24/24</a:t>
             </a:fld>
             <a:endParaRPr lang="en-US"/>
           </a:p>
@@ -5031,128 +5522,7 @@
           <a:p>
             <a:r>
               <a:rPr lang="en-US" dirty="0"/>
-              <a:t>1.4 - Functions</a:t>
-            </a:r>
-          </a:p>
-        </p:txBody>
-      </p:sp>
-      <p:pic>
-        <p:nvPicPr>
-          <p:cNvPr id="5" name="Content Placeholder 4" descr="A screenshot of a computer program&#10;&#10;Description automatically generated">
-            <a:extLst>
-              <a:ext uri="{FF2B5EF4-FFF2-40B4-BE49-F238E27FC236}">
-                <a16:creationId xmlns:a16="http://schemas.microsoft.com/office/drawing/2014/main" id="{70F361B7-28C9-6975-CEF8-51A8FEFDFB35}"/>
-              </a:ext>
-            </a:extLst>
-          </p:cNvPr>
-          <p:cNvPicPr>
-            <a:picLocks noGrp="1" noChangeAspect="1"/>
-          </p:cNvPicPr>
-          <p:nvPr>
-            <p:ph idx="1"/>
-          </p:nvPr>
-        </p:nvPicPr>
-        <p:blipFill rotWithShape="1">
-          <a:blip r:embed="rId2"/>
-          <a:srcRect b="28629"/>
-          <a:stretch/>
-        </p:blipFill>
-        <p:spPr>
-          <a:xfrm>
-            <a:off x="1204598" y="1836007"/>
-            <a:ext cx="9782803" cy="4037969"/>
-          </a:xfrm>
-        </p:spPr>
-      </p:pic>
-      <p:sp>
-        <p:nvSpPr>
-          <p:cNvPr id="3" name="TextBox 2">
-            <a:extLst>
-              <a:ext uri="{FF2B5EF4-FFF2-40B4-BE49-F238E27FC236}">
-                <a16:creationId xmlns:a16="http://schemas.microsoft.com/office/drawing/2014/main" id="{7D5168B7-D047-74B7-622A-48E1CC3A3E36}"/>
-              </a:ext>
-            </a:extLst>
-          </p:cNvPr>
-          <p:cNvSpPr txBox="1"/>
-          <p:nvPr/>
-        </p:nvSpPr>
-        <p:spPr>
-          <a:xfrm>
-            <a:off x="2596242" y="6019295"/>
-            <a:ext cx="4698274" cy="369332"/>
-          </a:xfrm>
-          <a:prstGeom prst="rect">
-            <a:avLst/>
-          </a:prstGeom>
-          <a:noFill/>
-        </p:spPr>
-        <p:txBody>
-          <a:bodyPr wrap="none" rtlCol="0">
-            <a:spAutoFit/>
-          </a:bodyPr>
-          <a:lstStyle/>
-          <a:p>
-            <a:r>
-              <a:rPr lang="en-US" dirty="0"/>
-              <a:t>Can you predict what this line of code will do?</a:t>
-            </a:r>
-          </a:p>
-        </p:txBody>
-      </p:sp>
-    </p:spTree>
-    <p:extLst>
-      <p:ext uri="{BB962C8B-B14F-4D97-AF65-F5344CB8AC3E}">
-        <p14:creationId xmlns:p14="http://schemas.microsoft.com/office/powerpoint/2010/main" val="3637622105"/>
-      </p:ext>
-    </p:extLst>
-  </p:cSld>
-  <p:clrMapOvr>
-    <a:masterClrMapping/>
-  </p:clrMapOvr>
-</p:sld>
-</file>
-
-<file path=ppt/slides/slide11.xml><?xml version="1.0" encoding="utf-8"?>
-<p:sld xmlns:a="http://schemas.openxmlformats.org/drawingml/2006/main" xmlns:r="http://schemas.openxmlformats.org/officeDocument/2006/relationships" xmlns:p="http://schemas.openxmlformats.org/presentationml/2006/main">
-  <p:cSld>
-    <p:spTree>
-      <p:nvGrpSpPr>
-        <p:cNvPr id="1" name=""/>
-        <p:cNvGrpSpPr/>
-        <p:nvPr/>
-      </p:nvGrpSpPr>
-      <p:grpSpPr>
-        <a:xfrm>
-          <a:off x="0" y="0"/>
-          <a:ext cx="0" cy="0"/>
-          <a:chOff x="0" y="0"/>
-          <a:chExt cx="0" cy="0"/>
-        </a:xfrm>
-      </p:grpSpPr>
-      <p:sp>
-        <p:nvSpPr>
-          <p:cNvPr id="2" name="Title 1">
-            <a:extLst>
-              <a:ext uri="{FF2B5EF4-FFF2-40B4-BE49-F238E27FC236}">
-                <a16:creationId xmlns:a16="http://schemas.microsoft.com/office/drawing/2014/main" id="{4F531A64-1948-2E3E-1D16-25998D929C65}"/>
-              </a:ext>
-            </a:extLst>
-          </p:cNvPr>
-          <p:cNvSpPr>
-            <a:spLocks noGrp="1"/>
-          </p:cNvSpPr>
-          <p:nvPr>
-            <p:ph type="title"/>
-          </p:nvPr>
-        </p:nvSpPr>
-        <p:spPr/>
-        <p:txBody>
-          <a:bodyPr/>
-          <a:lstStyle/>
-          <a:p>
-            <a:r>
-              <a:rPr lang="en-US" dirty="0"/>
-              <a:t>1.4 - Functions</a:t>
+              <a:t>In-Built Functions</a:t>
             </a:r>
           </a:p>
         </p:txBody>
@@ -5237,8 +5607,8 @@
             </a:prstGeom>
           </p:spPr>
         </p:pic>
-        <mc:AlternateContent xmlns:mc="http://schemas.openxmlformats.org/markup-compatibility/2006">
-          <mc:Choice xmlns:p14="http://schemas.microsoft.com/office/powerpoint/2010/main" Requires="p14">
+        <mc:AlternateContent xmlns:mc="http://schemas.openxmlformats.org/markup-compatibility/2006" xmlns:p14="http://schemas.microsoft.com/office/powerpoint/2010/main">
+          <mc:Choice Requires="p14">
             <p:contentPart p14:bwMode="auto" r:id="rId3">
               <p14:nvContentPartPr>
                 <p14:cNvPr id="8" name="Ink 7">
@@ -5257,7 +5627,7 @@
               </p14:xfrm>
             </p:contentPart>
           </mc:Choice>
-          <mc:Fallback>
+          <mc:Fallback xmlns="">
             <p:pic>
               <p:nvPicPr>
                 <p:cNvPr id="8" name="Ink 7">
@@ -5288,8 +5658,8 @@
             </p:pic>
           </mc:Fallback>
         </mc:AlternateContent>
-        <mc:AlternateContent xmlns:mc="http://schemas.openxmlformats.org/markup-compatibility/2006">
-          <mc:Choice xmlns:p14="http://schemas.microsoft.com/office/powerpoint/2010/main" Requires="p14">
+        <mc:AlternateContent xmlns:mc="http://schemas.openxmlformats.org/markup-compatibility/2006" xmlns:p14="http://schemas.microsoft.com/office/powerpoint/2010/main">
+          <mc:Choice Requires="p14">
             <p:contentPart p14:bwMode="auto" r:id="rId5">
               <p14:nvContentPartPr>
                 <p14:cNvPr id="12" name="Ink 11">
@@ -5308,7 +5678,7 @@
               </p14:xfrm>
             </p:contentPart>
           </mc:Choice>
-          <mc:Fallback>
+          <mc:Fallback xmlns="">
             <p:pic>
               <p:nvPicPr>
                 <p:cNvPr id="12" name="Ink 11">
@@ -5339,8 +5709,8 @@
             </p:pic>
           </mc:Fallback>
         </mc:AlternateContent>
-        <mc:AlternateContent xmlns:mc="http://schemas.openxmlformats.org/markup-compatibility/2006">
-          <mc:Choice xmlns:p14="http://schemas.microsoft.com/office/powerpoint/2010/main" Requires="p14">
+        <mc:AlternateContent xmlns:mc="http://schemas.openxmlformats.org/markup-compatibility/2006" xmlns:p14="http://schemas.microsoft.com/office/powerpoint/2010/main">
+          <mc:Choice Requires="p14">
             <p:contentPart p14:bwMode="auto" r:id="rId7">
               <p14:nvContentPartPr>
                 <p14:cNvPr id="13" name="Ink 12">
@@ -5359,7 +5729,7 @@
               </p14:xfrm>
             </p:contentPart>
           </mc:Choice>
-          <mc:Fallback>
+          <mc:Fallback xmlns="">
             <p:pic>
               <p:nvPicPr>
                 <p:cNvPr id="13" name="Ink 12">
@@ -5390,8 +5760,8 @@
             </p:pic>
           </mc:Fallback>
         </mc:AlternateContent>
-        <mc:AlternateContent xmlns:mc="http://schemas.openxmlformats.org/markup-compatibility/2006">
-          <mc:Choice xmlns:p14="http://schemas.microsoft.com/office/powerpoint/2010/main" Requires="p14">
+        <mc:AlternateContent xmlns:mc="http://schemas.openxmlformats.org/markup-compatibility/2006" xmlns:p14="http://schemas.microsoft.com/office/powerpoint/2010/main">
+          <mc:Choice Requires="p14">
             <p:contentPart p14:bwMode="auto" r:id="rId9">
               <p14:nvContentPartPr>
                 <p14:cNvPr id="14" name="Ink 13">
@@ -5410,7 +5780,7 @@
               </p14:xfrm>
             </p:contentPart>
           </mc:Choice>
-          <mc:Fallback>
+          <mc:Fallback xmlns="">
             <p:pic>
               <p:nvPicPr>
                 <p:cNvPr id="14" name="Ink 13">
@@ -5441,8 +5811,8 @@
             </p:pic>
           </mc:Fallback>
         </mc:AlternateContent>
-        <mc:AlternateContent xmlns:mc="http://schemas.openxmlformats.org/markup-compatibility/2006">
-          <mc:Choice xmlns:p14="http://schemas.microsoft.com/office/powerpoint/2010/main" Requires="p14">
+        <mc:AlternateContent xmlns:mc="http://schemas.openxmlformats.org/markup-compatibility/2006" xmlns:p14="http://schemas.microsoft.com/office/powerpoint/2010/main">
+          <mc:Choice Requires="p14">
             <p:contentPart p14:bwMode="auto" r:id="rId11">
               <p14:nvContentPartPr>
                 <p14:cNvPr id="15" name="Ink 14">
@@ -5461,7 +5831,7 @@
               </p14:xfrm>
             </p:contentPart>
           </mc:Choice>
-          <mc:Fallback>
+          <mc:Fallback xmlns="">
             <p:pic>
               <p:nvPicPr>
                 <p:cNvPr id="15" name="Ink 14">
@@ -5492,8 +5862,8 @@
             </p:pic>
           </mc:Fallback>
         </mc:AlternateContent>
-        <mc:AlternateContent xmlns:mc="http://schemas.openxmlformats.org/markup-compatibility/2006">
-          <mc:Choice xmlns:p14="http://schemas.microsoft.com/office/powerpoint/2010/main" Requires="p14">
+        <mc:AlternateContent xmlns:mc="http://schemas.openxmlformats.org/markup-compatibility/2006" xmlns:p14="http://schemas.microsoft.com/office/powerpoint/2010/main">
+          <mc:Choice Requires="p14">
             <p:contentPart p14:bwMode="auto" r:id="rId13">
               <p14:nvContentPartPr>
                 <p14:cNvPr id="17" name="Ink 16">
@@ -5512,7 +5882,7 @@
               </p14:xfrm>
             </p:contentPart>
           </mc:Choice>
-          <mc:Fallback>
+          <mc:Fallback xmlns="">
             <p:pic>
               <p:nvPicPr>
                 <p:cNvPr id="17" name="Ink 16">
@@ -5543,8 +5913,8 @@
             </p:pic>
           </mc:Fallback>
         </mc:AlternateContent>
-        <mc:AlternateContent xmlns:mc="http://schemas.openxmlformats.org/markup-compatibility/2006">
-          <mc:Choice xmlns:p14="http://schemas.microsoft.com/office/powerpoint/2010/main" Requires="p14">
+        <mc:AlternateContent xmlns:mc="http://schemas.openxmlformats.org/markup-compatibility/2006" xmlns:p14="http://schemas.microsoft.com/office/powerpoint/2010/main">
+          <mc:Choice Requires="p14">
             <p:contentPart p14:bwMode="auto" r:id="rId15">
               <p14:nvContentPartPr>
                 <p14:cNvPr id="18" name="Ink 17">
@@ -5563,7 +5933,7 @@
               </p14:xfrm>
             </p:contentPart>
           </mc:Choice>
-          <mc:Fallback>
+          <mc:Fallback xmlns="">
             <p:pic>
               <p:nvPicPr>
                 <p:cNvPr id="18" name="Ink 17">
@@ -5594,8 +5964,8 @@
             </p:pic>
           </mc:Fallback>
         </mc:AlternateContent>
-        <mc:AlternateContent xmlns:mc="http://schemas.openxmlformats.org/markup-compatibility/2006">
-          <mc:Choice xmlns:p14="http://schemas.microsoft.com/office/powerpoint/2010/main" Requires="p14">
+        <mc:AlternateContent xmlns:mc="http://schemas.openxmlformats.org/markup-compatibility/2006" xmlns:p14="http://schemas.microsoft.com/office/powerpoint/2010/main">
+          <mc:Choice Requires="p14">
             <p:contentPart p14:bwMode="auto" r:id="rId17">
               <p14:nvContentPartPr>
                 <p14:cNvPr id="19" name="Ink 18">
@@ -5614,7 +5984,7 @@
               </p14:xfrm>
             </p:contentPart>
           </mc:Choice>
-          <mc:Fallback>
+          <mc:Fallback xmlns="">
             <p:pic>
               <p:nvPicPr>
                 <p:cNvPr id="19" name="Ink 18">
@@ -5645,8 +6015,8 @@
             </p:pic>
           </mc:Fallback>
         </mc:AlternateContent>
-        <mc:AlternateContent xmlns:mc="http://schemas.openxmlformats.org/markup-compatibility/2006">
-          <mc:Choice xmlns:p14="http://schemas.microsoft.com/office/powerpoint/2010/main" Requires="p14">
+        <mc:AlternateContent xmlns:mc="http://schemas.openxmlformats.org/markup-compatibility/2006" xmlns:p14="http://schemas.microsoft.com/office/powerpoint/2010/main">
+          <mc:Choice Requires="p14">
             <p:contentPart p14:bwMode="auto" r:id="rId19">
               <p14:nvContentPartPr>
                 <p14:cNvPr id="21" name="Ink 20">
@@ -5665,7 +6035,7 @@
               </p14:xfrm>
             </p:contentPart>
           </mc:Choice>
-          <mc:Fallback>
+          <mc:Fallback xmlns="">
             <p:pic>
               <p:nvPicPr>
                 <p:cNvPr id="21" name="Ink 20">
@@ -5696,8 +6066,8 @@
             </p:pic>
           </mc:Fallback>
         </mc:AlternateContent>
-        <mc:AlternateContent xmlns:mc="http://schemas.openxmlformats.org/markup-compatibility/2006">
-          <mc:Choice xmlns:p14="http://schemas.microsoft.com/office/powerpoint/2010/main" Requires="p14">
+        <mc:AlternateContent xmlns:mc="http://schemas.openxmlformats.org/markup-compatibility/2006" xmlns:p14="http://schemas.microsoft.com/office/powerpoint/2010/main">
+          <mc:Choice Requires="p14">
             <p:contentPart p14:bwMode="auto" r:id="rId21">
               <p14:nvContentPartPr>
                 <p14:cNvPr id="22" name="Ink 21">
@@ -5716,7 +6086,7 @@
               </p14:xfrm>
             </p:contentPart>
           </mc:Choice>
-          <mc:Fallback>
+          <mc:Fallback xmlns="">
             <p:pic>
               <p:nvPicPr>
                 <p:cNvPr id="22" name="Ink 21">
@@ -5747,8 +6117,8 @@
             </p:pic>
           </mc:Fallback>
         </mc:AlternateContent>
-        <mc:AlternateContent xmlns:mc="http://schemas.openxmlformats.org/markup-compatibility/2006">
-          <mc:Choice xmlns:p14="http://schemas.microsoft.com/office/powerpoint/2010/main" Requires="p14">
+        <mc:AlternateContent xmlns:mc="http://schemas.openxmlformats.org/markup-compatibility/2006" xmlns:p14="http://schemas.microsoft.com/office/powerpoint/2010/main">
+          <mc:Choice Requires="p14">
             <p:contentPart p14:bwMode="auto" r:id="rId23">
               <p14:nvContentPartPr>
                 <p14:cNvPr id="23" name="Ink 22">
@@ -5767,7 +6137,7 @@
               </p14:xfrm>
             </p:contentPart>
           </mc:Choice>
-          <mc:Fallback>
+          <mc:Fallback xmlns="">
             <p:pic>
               <p:nvPicPr>
                 <p:cNvPr id="23" name="Ink 22">
@@ -5798,8 +6168,8 @@
             </p:pic>
           </mc:Fallback>
         </mc:AlternateContent>
-        <mc:AlternateContent xmlns:mc="http://schemas.openxmlformats.org/markup-compatibility/2006">
-          <mc:Choice xmlns:p14="http://schemas.microsoft.com/office/powerpoint/2010/main" Requires="p14">
+        <mc:AlternateContent xmlns:mc="http://schemas.openxmlformats.org/markup-compatibility/2006" xmlns:p14="http://schemas.microsoft.com/office/powerpoint/2010/main">
+          <mc:Choice Requires="p14">
             <p:contentPart p14:bwMode="auto" r:id="rId25">
               <p14:nvContentPartPr>
                 <p14:cNvPr id="24" name="Ink 23">
@@ -5818,7 +6188,7 @@
               </p14:xfrm>
             </p:contentPart>
           </mc:Choice>
-          <mc:Fallback>
+          <mc:Fallback xmlns="">
             <p:pic>
               <p:nvPicPr>
                 <p:cNvPr id="24" name="Ink 23">
@@ -5849,8 +6219,8 @@
             </p:pic>
           </mc:Fallback>
         </mc:AlternateContent>
-        <mc:AlternateContent xmlns:mc="http://schemas.openxmlformats.org/markup-compatibility/2006">
-          <mc:Choice xmlns:p14="http://schemas.microsoft.com/office/powerpoint/2010/main" Requires="p14">
+        <mc:AlternateContent xmlns:mc="http://schemas.openxmlformats.org/markup-compatibility/2006" xmlns:p14="http://schemas.microsoft.com/office/powerpoint/2010/main">
+          <mc:Choice Requires="p14">
             <p:contentPart p14:bwMode="auto" r:id="rId27">
               <p14:nvContentPartPr>
                 <p14:cNvPr id="25" name="Ink 24">
@@ -5869,7 +6239,7 @@
               </p14:xfrm>
             </p:contentPart>
           </mc:Choice>
-          <mc:Fallback>
+          <mc:Fallback xmlns="">
             <p:pic>
               <p:nvPicPr>
                 <p:cNvPr id="25" name="Ink 24">
@@ -5900,8 +6270,8 @@
             </p:pic>
           </mc:Fallback>
         </mc:AlternateContent>
-        <mc:AlternateContent xmlns:mc="http://schemas.openxmlformats.org/markup-compatibility/2006">
-          <mc:Choice xmlns:p14="http://schemas.microsoft.com/office/powerpoint/2010/main" Requires="p14">
+        <mc:AlternateContent xmlns:mc="http://schemas.openxmlformats.org/markup-compatibility/2006" xmlns:p14="http://schemas.microsoft.com/office/powerpoint/2010/main">
+          <mc:Choice Requires="p14">
             <p:contentPart p14:bwMode="auto" r:id="rId29">
               <p14:nvContentPartPr>
                 <p14:cNvPr id="26" name="Ink 25">
@@ -5920,7 +6290,7 @@
               </p14:xfrm>
             </p:contentPart>
           </mc:Choice>
-          <mc:Fallback>
+          <mc:Fallback xmlns="">
             <p:pic>
               <p:nvPicPr>
                 <p:cNvPr id="26" name="Ink 25">
@@ -5951,8 +6321,8 @@
             </p:pic>
           </mc:Fallback>
         </mc:AlternateContent>
-        <mc:AlternateContent xmlns:mc="http://schemas.openxmlformats.org/markup-compatibility/2006">
-          <mc:Choice xmlns:p14="http://schemas.microsoft.com/office/powerpoint/2010/main" Requires="p14">
+        <mc:AlternateContent xmlns:mc="http://schemas.openxmlformats.org/markup-compatibility/2006" xmlns:p14="http://schemas.microsoft.com/office/powerpoint/2010/main">
+          <mc:Choice Requires="p14">
             <p:contentPart p14:bwMode="auto" r:id="rId31">
               <p14:nvContentPartPr>
                 <p14:cNvPr id="27" name="Ink 26">
@@ -5971,7 +6341,7 @@
               </p14:xfrm>
             </p:contentPart>
           </mc:Choice>
-          <mc:Fallback>
+          <mc:Fallback xmlns="">
             <p:pic>
               <p:nvPicPr>
                 <p:cNvPr id="27" name="Ink 26">
@@ -6002,8 +6372,8 @@
             </p:pic>
           </mc:Fallback>
         </mc:AlternateContent>
-        <mc:AlternateContent xmlns:mc="http://schemas.openxmlformats.org/markup-compatibility/2006">
-          <mc:Choice xmlns:p14="http://schemas.microsoft.com/office/powerpoint/2010/main" Requires="p14">
+        <mc:AlternateContent xmlns:mc="http://schemas.openxmlformats.org/markup-compatibility/2006" xmlns:p14="http://schemas.microsoft.com/office/powerpoint/2010/main">
+          <mc:Choice Requires="p14">
             <p:contentPart p14:bwMode="auto" r:id="rId33">
               <p14:nvContentPartPr>
                 <p14:cNvPr id="28" name="Ink 27">
@@ -6022,7 +6392,7 @@
               </p14:xfrm>
             </p:contentPart>
           </mc:Choice>
-          <mc:Fallback>
+          <mc:Fallback xmlns="">
             <p:pic>
               <p:nvPicPr>
                 <p:cNvPr id="28" name="Ink 27">
@@ -6053,8 +6423,8 @@
             </p:pic>
           </mc:Fallback>
         </mc:AlternateContent>
-        <mc:AlternateContent xmlns:mc="http://schemas.openxmlformats.org/markup-compatibility/2006">
-          <mc:Choice xmlns:p14="http://schemas.microsoft.com/office/powerpoint/2010/main" Requires="p14">
+        <mc:AlternateContent xmlns:mc="http://schemas.openxmlformats.org/markup-compatibility/2006" xmlns:p14="http://schemas.microsoft.com/office/powerpoint/2010/main">
+          <mc:Choice Requires="p14">
             <p:contentPart p14:bwMode="auto" r:id="rId35">
               <p14:nvContentPartPr>
                 <p14:cNvPr id="29" name="Ink 28">
@@ -6073,7 +6443,7 @@
               </p14:xfrm>
             </p:contentPart>
           </mc:Choice>
-          <mc:Fallback>
+          <mc:Fallback xmlns="">
             <p:pic>
               <p:nvPicPr>
                 <p:cNvPr id="29" name="Ink 28">
@@ -6104,8 +6474,8 @@
             </p:pic>
           </mc:Fallback>
         </mc:AlternateContent>
-        <mc:AlternateContent xmlns:mc="http://schemas.openxmlformats.org/markup-compatibility/2006">
-          <mc:Choice xmlns:p14="http://schemas.microsoft.com/office/powerpoint/2010/main" Requires="p14">
+        <mc:AlternateContent xmlns:mc="http://schemas.openxmlformats.org/markup-compatibility/2006" xmlns:p14="http://schemas.microsoft.com/office/powerpoint/2010/main">
+          <mc:Choice Requires="p14">
             <p:contentPart p14:bwMode="auto" r:id="rId37">
               <p14:nvContentPartPr>
                 <p14:cNvPr id="30" name="Ink 29">
@@ -6124,7 +6494,7 @@
               </p14:xfrm>
             </p:contentPart>
           </mc:Choice>
-          <mc:Fallback>
+          <mc:Fallback xmlns="">
             <p:pic>
               <p:nvPicPr>
                 <p:cNvPr id="30" name="Ink 29">
@@ -6155,8 +6525,8 @@
             </p:pic>
           </mc:Fallback>
         </mc:AlternateContent>
-        <mc:AlternateContent xmlns:mc="http://schemas.openxmlformats.org/markup-compatibility/2006">
-          <mc:Choice xmlns:p14="http://schemas.microsoft.com/office/powerpoint/2010/main" Requires="p14">
+        <mc:AlternateContent xmlns:mc="http://schemas.openxmlformats.org/markup-compatibility/2006" xmlns:p14="http://schemas.microsoft.com/office/powerpoint/2010/main">
+          <mc:Choice Requires="p14">
             <p:contentPart p14:bwMode="auto" r:id="rId39">
               <p14:nvContentPartPr>
                 <p14:cNvPr id="31" name="Ink 30">
@@ -6175,7 +6545,7 @@
               </p14:xfrm>
             </p:contentPart>
           </mc:Choice>
-          <mc:Fallback>
+          <mc:Fallback xmlns="">
             <p:pic>
               <p:nvPicPr>
                 <p:cNvPr id="31" name="Ink 30">
@@ -6206,8 +6576,8 @@
             </p:pic>
           </mc:Fallback>
         </mc:AlternateContent>
-        <mc:AlternateContent xmlns:mc="http://schemas.openxmlformats.org/markup-compatibility/2006">
-          <mc:Choice xmlns:p14="http://schemas.microsoft.com/office/powerpoint/2010/main" Requires="p14">
+        <mc:AlternateContent xmlns:mc="http://schemas.openxmlformats.org/markup-compatibility/2006" xmlns:p14="http://schemas.microsoft.com/office/powerpoint/2010/main">
+          <mc:Choice Requires="p14">
             <p:contentPart p14:bwMode="auto" r:id="rId41">
               <p14:nvContentPartPr>
                 <p14:cNvPr id="32" name="Ink 31">
@@ -6226,7 +6596,7 @@
               </p14:xfrm>
             </p:contentPart>
           </mc:Choice>
-          <mc:Fallback>
+          <mc:Fallback xmlns="">
             <p:pic>
               <p:nvPicPr>
                 <p:cNvPr id="32" name="Ink 31">
@@ -6257,8 +6627,8 @@
             </p:pic>
           </mc:Fallback>
         </mc:AlternateContent>
-        <mc:AlternateContent xmlns:mc="http://schemas.openxmlformats.org/markup-compatibility/2006">
-          <mc:Choice xmlns:p14="http://schemas.microsoft.com/office/powerpoint/2010/main" Requires="p14">
+        <mc:AlternateContent xmlns:mc="http://schemas.openxmlformats.org/markup-compatibility/2006" xmlns:p14="http://schemas.microsoft.com/office/powerpoint/2010/main">
+          <mc:Choice Requires="p14">
             <p:contentPart p14:bwMode="auto" r:id="rId43">
               <p14:nvContentPartPr>
                 <p14:cNvPr id="33" name="Ink 32">
@@ -6277,7 +6647,7 @@
               </p14:xfrm>
             </p:contentPart>
           </mc:Choice>
-          <mc:Fallback>
+          <mc:Fallback xmlns="">
             <p:pic>
               <p:nvPicPr>
                 <p:cNvPr id="33" name="Ink 32">
@@ -6308,8 +6678,8 @@
             </p:pic>
           </mc:Fallback>
         </mc:AlternateContent>
-        <mc:AlternateContent xmlns:mc="http://schemas.openxmlformats.org/markup-compatibility/2006">
-          <mc:Choice xmlns:p14="http://schemas.microsoft.com/office/powerpoint/2010/main" Requires="p14">
+        <mc:AlternateContent xmlns:mc="http://schemas.openxmlformats.org/markup-compatibility/2006" xmlns:p14="http://schemas.microsoft.com/office/powerpoint/2010/main">
+          <mc:Choice Requires="p14">
             <p:contentPart p14:bwMode="auto" r:id="rId45">
               <p14:nvContentPartPr>
                 <p14:cNvPr id="34" name="Ink 33">
@@ -6328,7 +6698,7 @@
               </p14:xfrm>
             </p:contentPart>
           </mc:Choice>
-          <mc:Fallback>
+          <mc:Fallback xmlns="">
             <p:pic>
               <p:nvPicPr>
                 <p:cNvPr id="34" name="Ink 33">
@@ -6359,8 +6729,8 @@
             </p:pic>
           </mc:Fallback>
         </mc:AlternateContent>
-        <mc:AlternateContent xmlns:mc="http://schemas.openxmlformats.org/markup-compatibility/2006">
-          <mc:Choice xmlns:p14="http://schemas.microsoft.com/office/powerpoint/2010/main" Requires="p14">
+        <mc:AlternateContent xmlns:mc="http://schemas.openxmlformats.org/markup-compatibility/2006" xmlns:p14="http://schemas.microsoft.com/office/powerpoint/2010/main">
+          <mc:Choice Requires="p14">
             <p:contentPart p14:bwMode="auto" r:id="rId47">
               <p14:nvContentPartPr>
                 <p14:cNvPr id="36" name="Ink 35">
@@ -6379,7 +6749,7 @@
               </p14:xfrm>
             </p:contentPart>
           </mc:Choice>
-          <mc:Fallback>
+          <mc:Fallback xmlns="">
             <p:pic>
               <p:nvPicPr>
                 <p:cNvPr id="36" name="Ink 35">
@@ -6410,8 +6780,8 @@
             </p:pic>
           </mc:Fallback>
         </mc:AlternateContent>
-        <mc:AlternateContent xmlns:mc="http://schemas.openxmlformats.org/markup-compatibility/2006">
-          <mc:Choice xmlns:p14="http://schemas.microsoft.com/office/powerpoint/2010/main" Requires="p14">
+        <mc:AlternateContent xmlns:mc="http://schemas.openxmlformats.org/markup-compatibility/2006" xmlns:p14="http://schemas.microsoft.com/office/powerpoint/2010/main">
+          <mc:Choice Requires="p14">
             <p:contentPart p14:bwMode="auto" r:id="rId49">
               <p14:nvContentPartPr>
                 <p14:cNvPr id="37" name="Ink 36">
@@ -6430,7 +6800,7 @@
               </p14:xfrm>
             </p:contentPart>
           </mc:Choice>
-          <mc:Fallback>
+          <mc:Fallback xmlns="">
             <p:pic>
               <p:nvPicPr>
                 <p:cNvPr id="37" name="Ink 36">
@@ -6461,8 +6831,8 @@
             </p:pic>
           </mc:Fallback>
         </mc:AlternateContent>
-        <mc:AlternateContent xmlns:mc="http://schemas.openxmlformats.org/markup-compatibility/2006">
-          <mc:Choice xmlns:p14="http://schemas.microsoft.com/office/powerpoint/2010/main" Requires="p14">
+        <mc:AlternateContent xmlns:mc="http://schemas.openxmlformats.org/markup-compatibility/2006" xmlns:p14="http://schemas.microsoft.com/office/powerpoint/2010/main">
+          <mc:Choice Requires="p14">
             <p:contentPart p14:bwMode="auto" r:id="rId51">
               <p14:nvContentPartPr>
                 <p14:cNvPr id="38" name="Ink 37">
@@ -6481,7 +6851,7 @@
               </p14:xfrm>
             </p:contentPart>
           </mc:Choice>
-          <mc:Fallback>
+          <mc:Fallback xmlns="">
             <p:pic>
               <p:nvPicPr>
                 <p:cNvPr id="38" name="Ink 37">
@@ -6512,8 +6882,8 @@
             </p:pic>
           </mc:Fallback>
         </mc:AlternateContent>
-        <mc:AlternateContent xmlns:mc="http://schemas.openxmlformats.org/markup-compatibility/2006">
-          <mc:Choice xmlns:p14="http://schemas.microsoft.com/office/powerpoint/2010/main" Requires="p14">
+        <mc:AlternateContent xmlns:mc="http://schemas.openxmlformats.org/markup-compatibility/2006" xmlns:p14="http://schemas.microsoft.com/office/powerpoint/2010/main">
+          <mc:Choice Requires="p14">
             <p:contentPart p14:bwMode="auto" r:id="rId53">
               <p14:nvContentPartPr>
                 <p14:cNvPr id="39" name="Ink 38">
@@ -6532,7 +6902,7 @@
               </p14:xfrm>
             </p:contentPart>
           </mc:Choice>
-          <mc:Fallback>
+          <mc:Fallback xmlns="">
             <p:pic>
               <p:nvPicPr>
                 <p:cNvPr id="39" name="Ink 38">
@@ -6577,7 +6947,7 @@
 </p:sld>
 </file>
 
-<file path=ppt/slides/slide12.xml><?xml version="1.0" encoding="utf-8"?>
+<file path=ppt/slides/slide11.xml><?xml version="1.0" encoding="utf-8"?>
 <p:sld xmlns:a="http://schemas.openxmlformats.org/drawingml/2006/main" xmlns:r="http://schemas.openxmlformats.org/officeDocument/2006/relationships" xmlns:p="http://schemas.openxmlformats.org/presentationml/2006/main">
   <p:cSld>
     <p:spTree>
@@ -6617,7 +6987,7 @@
           <a:p>
             <a:r>
               <a:rPr lang="en-US" dirty="0"/>
-              <a:t>1.5 - Modules</a:t>
+              <a:t>Modules</a:t>
             </a:r>
           </a:p>
         </p:txBody>
@@ -6639,7 +7009,7 @@
           </p:nvPr>
         </p:nvPicPr>
         <p:blipFill>
-          <a:blip r:embed="rId2"/>
+          <a:blip r:embed="rId3"/>
           <a:stretch>
             <a:fillRect/>
           </a:stretch>
@@ -6664,7 +7034,7 @@
 </p:sld>
 </file>
 
-<file path=ppt/slides/slide13.xml><?xml version="1.0" encoding="utf-8"?>
+<file path=ppt/slides/slide12.xml><?xml version="1.0" encoding="utf-8"?>
 <p:sld xmlns:a="http://schemas.openxmlformats.org/drawingml/2006/main" xmlns:r="http://schemas.openxmlformats.org/officeDocument/2006/relationships" xmlns:p="http://schemas.openxmlformats.org/presentationml/2006/main">
   <p:cSld>
     <p:spTree>
@@ -6704,7 +7074,7 @@
           <a:p>
             <a:r>
               <a:rPr lang="en-US" dirty="0"/>
-              <a:t>1.6 - Turtles</a:t>
+              <a:t>Turtles!!!</a:t>
             </a:r>
           </a:p>
         </p:txBody>
@@ -6760,7 +7130,7 @@
           <p:nvPr/>
         </p:nvPicPr>
         <p:blipFill>
-          <a:blip r:embed="rId2"/>
+          <a:blip r:embed="rId3"/>
           <a:stretch>
             <a:fillRect/>
           </a:stretch>
@@ -6788,7 +7158,7 @@
 </p:sld>
 </file>
 
-<file path=ppt/slides/slide14.xml><?xml version="1.0" encoding="utf-8"?>
+<file path=ppt/slides/slide13.xml><?xml version="1.0" encoding="utf-8"?>
 <p:sld xmlns:a="http://schemas.openxmlformats.org/drawingml/2006/main" xmlns:r="http://schemas.openxmlformats.org/officeDocument/2006/relationships" xmlns:p="http://schemas.openxmlformats.org/presentationml/2006/main">
   <p:cSld>
     <p:spTree>
@@ -6879,7 +7249,7 @@
 </p:sld>
 </file>
 
-<file path=ppt/slides/slide15.xml><?xml version="1.0" encoding="utf-8"?>
+<file path=ppt/slides/slide14.xml><?xml version="1.0" encoding="utf-8"?>
 <p:sld xmlns:a="http://schemas.openxmlformats.org/drawingml/2006/main" xmlns:r="http://schemas.openxmlformats.org/officeDocument/2006/relationships" xmlns:p="http://schemas.openxmlformats.org/presentationml/2006/main" show="0">
   <p:cSld>
     <p:spTree>
@@ -6993,7 +7363,7 @@
 </p:sld>
 </file>
 
-<file path=ppt/slides/slide16.xml><?xml version="1.0" encoding="utf-8"?>
+<file path=ppt/slides/slide15.xml><?xml version="1.0" encoding="utf-8"?>
 <p:sld xmlns:a="http://schemas.openxmlformats.org/drawingml/2006/main" xmlns:r="http://schemas.openxmlformats.org/officeDocument/2006/relationships" xmlns:p="http://schemas.openxmlformats.org/presentationml/2006/main">
   <p:cSld>
     <p:spTree>
@@ -7126,7 +7496,7 @@
 </p:sld>
 </file>
 
-<file path=ppt/slides/slide17.xml><?xml version="1.0" encoding="utf-8"?>
+<file path=ppt/slides/slide16.xml><?xml version="1.0" encoding="utf-8"?>
 <p:sld xmlns:a="http://schemas.openxmlformats.org/drawingml/2006/main" xmlns:r="http://schemas.openxmlformats.org/officeDocument/2006/relationships" xmlns:p="http://schemas.openxmlformats.org/presentationml/2006/main">
   <p:cSld>
     <p:spTree>
@@ -7298,7 +7668,7 @@
 </p:sld>
 </file>
 
-<file path=ppt/slides/slide18.xml><?xml version="1.0" encoding="utf-8"?>
+<file path=ppt/slides/slide17.xml><?xml version="1.0" encoding="utf-8"?>
 <p:sld xmlns:a="http://schemas.openxmlformats.org/drawingml/2006/main" xmlns:r="http://schemas.openxmlformats.org/officeDocument/2006/relationships" xmlns:p="http://schemas.openxmlformats.org/presentationml/2006/main">
   <p:cSld>
     <p:spTree>
@@ -7385,6 +7755,121 @@
 </p:sld>
 </file>
 
+<file path=ppt/slides/slide18.xml><?xml version="1.0" encoding="utf-8"?>
+<p:sld xmlns:a="http://schemas.openxmlformats.org/drawingml/2006/main" xmlns:r="http://schemas.openxmlformats.org/officeDocument/2006/relationships" xmlns:p="http://schemas.openxmlformats.org/presentationml/2006/main">
+  <p:cSld>
+    <p:spTree>
+      <p:nvGrpSpPr>
+        <p:cNvPr id="1" name=""/>
+        <p:cNvGrpSpPr/>
+        <p:nvPr/>
+      </p:nvGrpSpPr>
+      <p:grpSpPr>
+        <a:xfrm>
+          <a:off x="0" y="0"/>
+          <a:ext cx="0" cy="0"/>
+          <a:chOff x="0" y="0"/>
+          <a:chExt cx="0" cy="0"/>
+        </a:xfrm>
+      </p:grpSpPr>
+      <p:sp>
+        <p:nvSpPr>
+          <p:cNvPr id="2" name="Title 1">
+            <a:extLst>
+              <a:ext uri="{FF2B5EF4-FFF2-40B4-BE49-F238E27FC236}">
+                <a16:creationId xmlns:a16="http://schemas.microsoft.com/office/drawing/2014/main" id="{FEA057E2-7646-C813-10BE-88165D2E6CAF}"/>
+              </a:ext>
+            </a:extLst>
+          </p:cNvPr>
+          <p:cNvSpPr>
+            <a:spLocks noGrp="1"/>
+          </p:cNvSpPr>
+          <p:nvPr>
+            <p:ph type="title"/>
+          </p:nvPr>
+        </p:nvSpPr>
+        <p:spPr/>
+        <p:txBody>
+          <a:bodyPr/>
+          <a:lstStyle/>
+          <a:p>
+            <a:r>
+              <a:rPr lang="en-US" dirty="0"/>
+              <a:t>1.4 - Conditionals</a:t>
+            </a:r>
+          </a:p>
+        </p:txBody>
+      </p:sp>
+      <p:sp>
+        <p:nvSpPr>
+          <p:cNvPr id="4" name="Content Placeholder 3">
+            <a:extLst>
+              <a:ext uri="{FF2B5EF4-FFF2-40B4-BE49-F238E27FC236}">
+                <a16:creationId xmlns:a16="http://schemas.microsoft.com/office/drawing/2014/main" id="{950825A1-BDF6-0F6D-0F09-AD6C0A9FACDA}"/>
+              </a:ext>
+            </a:extLst>
+          </p:cNvPr>
+          <p:cNvSpPr>
+            <a:spLocks noGrp="1"/>
+          </p:cNvSpPr>
+          <p:nvPr>
+            <p:ph idx="1"/>
+          </p:nvPr>
+        </p:nvSpPr>
+        <p:spPr/>
+        <p:txBody>
+          <a:bodyPr/>
+          <a:lstStyle/>
+          <a:p>
+            <a:r>
+              <a:rPr lang="en-US" dirty="0"/>
+              <a:t>If statements</a:t>
+            </a:r>
+          </a:p>
+          <a:p>
+            <a:r>
+              <a:rPr lang="en-US" dirty="0"/>
+              <a:t>If statements take a </a:t>
+            </a:r>
+            <a:r>
+              <a:rPr lang="en-US" dirty="0" err="1"/>
+              <a:t>boolean</a:t>
+            </a:r>
+            <a:r>
+              <a:rPr lang="en-US" dirty="0"/>
+              <a:t> (True/False) value as an argument to decide whether the code inside is executed</a:t>
+            </a:r>
+          </a:p>
+          <a:p>
+            <a:r>
+              <a:rPr lang="en-US" dirty="0"/>
+              <a:t>The argument can be complex, as long as the result is Boolean</a:t>
+            </a:r>
+          </a:p>
+          <a:p>
+            <a:endParaRPr lang="en-US" dirty="0"/>
+          </a:p>
+          <a:p>
+            <a:r>
+              <a:rPr lang="en-US" dirty="0"/>
+              <a:t>Co-lab</a:t>
+            </a:r>
+          </a:p>
+        </p:txBody>
+      </p:sp>
+    </p:spTree>
+    <p:extLst>
+      <p:ext uri="{BB962C8B-B14F-4D97-AF65-F5344CB8AC3E}">
+        <p14:creationId xmlns:p14="http://schemas.microsoft.com/office/powerpoint/2010/main" val="333509690"/>
+      </p:ext>
+    </p:extLst>
+  </p:cSld>
+  <p:clrMapOvr>
+    <a:masterClrMapping/>
+  </p:clrMapOvr>
+</p:sld>
+</file>
+
 <file path=ppt/slides/slide19.xml><?xml version="1.0" encoding="utf-8"?>
 <p:sld xmlns:a="http://schemas.openxmlformats.org/drawingml/2006/main" xmlns:r="http://schemas.openxmlformats.org/officeDocument/2006/relationships" xmlns:p="http://schemas.openxmlformats.org/presentationml/2006/main">
   <p:cSld>
@@ -7425,7 +7910,7 @@
           <a:p>
             <a:r>
               <a:rPr lang="en-US" dirty="0"/>
-              <a:t>1.4 - Conditionals</a:t>
+              <a:t>1.5 - Filtering</a:t>
             </a:r>
           </a:p>
         </p:txBody>
@@ -7453,44 +7938,52 @@
           <a:p>
             <a:r>
               <a:rPr lang="en-US" dirty="0"/>
-              <a:t>If statements</a:t>
-            </a:r>
-          </a:p>
-          <a:p>
-            <a:r>
-              <a:rPr lang="en-US" dirty="0"/>
-              <a:t>If statements take a </a:t>
+              <a:t>Filtering </a:t>
             </a:r>
             <a:r>
               <a:rPr lang="en-US" dirty="0" err="1"/>
-              <a:t>boolean</a:t>
-            </a:r>
-            <a:r>
-              <a:rPr lang="en-US" dirty="0"/>
-              <a:t> (True/False) value as an argument to decide whether the code inside is executed</a:t>
-            </a:r>
-          </a:p>
-          <a:p>
-            <a:r>
-              <a:rPr lang="en-US" dirty="0"/>
-              <a:t>The argument can be complex, as long as the result is Boolean</a:t>
-            </a:r>
-          </a:p>
-          <a:p>
+              <a:t>dataframes</a:t>
+            </a:r>
+            <a:r>
+              <a:rPr lang="en-US" dirty="0"/>
+              <a:t> works like a series of if statements: check each row </a:t>
+            </a:r>
+            <a:r>
+              <a:rPr lang="en-US" dirty="0">
+                <a:sym typeface="Wingdings" pitchFamily="2" charset="2"/>
+              </a:rPr>
+              <a:t></a:t>
+            </a:r>
+            <a:r>
+              <a:rPr lang="en-US" dirty="0"/>
+              <a:t> calculate Boolean </a:t>
+            </a:r>
+            <a:r>
+              <a:rPr lang="en-US" dirty="0">
+                <a:sym typeface="Wingdings" pitchFamily="2" charset="2"/>
+              </a:rPr>
+              <a:t> if True/</a:t>
+            </a:r>
+            <a:r>
+              <a:rPr lang="en-US" dirty="0" err="1">
+                <a:sym typeface="Wingdings" pitchFamily="2" charset="2"/>
+              </a:rPr>
+              <a:t>elif</a:t>
+            </a:r>
+            <a:r>
+              <a:rPr lang="en-US" dirty="0">
+                <a:sym typeface="Wingdings" pitchFamily="2" charset="2"/>
+              </a:rPr>
+              <a:t> False</a:t>
+            </a:r>
             <a:endParaRPr lang="en-US" dirty="0"/>
-          </a:p>
-          <a:p>
-            <a:r>
-              <a:rPr lang="en-US" dirty="0"/>
-              <a:t>Co-lab</a:t>
-            </a:r>
           </a:p>
         </p:txBody>
       </p:sp>
     </p:spTree>
     <p:extLst>
       <p:ext uri="{BB962C8B-B14F-4D97-AF65-F5344CB8AC3E}">
-        <p14:creationId xmlns:p14="http://schemas.microsoft.com/office/powerpoint/2010/main" val="333509690"/>
+        <p14:creationId xmlns:p14="http://schemas.microsoft.com/office/powerpoint/2010/main" val="1075228923"/>
       </p:ext>
     </p:extLst>
   </p:cSld>
@@ -7540,7 +8033,7 @@
           <a:p>
             <a:r>
               <a:rPr lang="en-US" dirty="0"/>
-              <a:t>1.1 - Motivation</a:t>
+              <a:t>Motivation</a:t>
             </a:r>
           </a:p>
         </p:txBody>
@@ -7943,7 +8436,7 @@
           <p:cNvPr id="4" name="Content Placeholder 3">
             <a:extLst>
               <a:ext uri="{FF2B5EF4-FFF2-40B4-BE49-F238E27FC236}">
-                <a16:creationId xmlns:a16="http://schemas.microsoft.com/office/drawing/2014/main" id="{950825A1-BDF6-0F6D-0F09-AD6C0A9FACDA}"/>
+                <a16:creationId xmlns:a16="http://schemas.microsoft.com/office/drawing/2014/main" id="{F4B24BAC-E46D-484A-A74A-8F7DF6CBA844}"/>
               </a:ext>
             </a:extLst>
           </p:cNvPr>
@@ -7961,52 +8454,41 @@
           <a:p>
             <a:r>
               <a:rPr lang="en-US" dirty="0"/>
-              <a:t>Filtering </a:t>
-            </a:r>
-            <a:r>
-              <a:rPr lang="en-US" dirty="0" err="1"/>
-              <a:t>dataframes</a:t>
-            </a:r>
-            <a:r>
-              <a:rPr lang="en-US" dirty="0"/>
-              <a:t> works like a series of if statements: check each row </a:t>
-            </a:r>
-            <a:r>
-              <a:rPr lang="en-US" dirty="0">
-                <a:sym typeface="Wingdings" pitchFamily="2" charset="2"/>
-              </a:rPr>
-              <a:t></a:t>
-            </a:r>
-            <a:r>
-              <a:rPr lang="en-US" dirty="0"/>
-              <a:t> calculate Boolean </a:t>
-            </a:r>
-            <a:r>
-              <a:rPr lang="en-US" dirty="0">
-                <a:sym typeface="Wingdings" pitchFamily="2" charset="2"/>
-              </a:rPr>
-              <a:t> if True/</a:t>
-            </a:r>
-            <a:r>
-              <a:rPr lang="en-US" dirty="0" err="1">
-                <a:sym typeface="Wingdings" pitchFamily="2" charset="2"/>
-              </a:rPr>
-              <a:t>elif</a:t>
-            </a:r>
-            <a:r>
-              <a:rPr lang="en-US" dirty="0">
-                <a:sym typeface="Wingdings" pitchFamily="2" charset="2"/>
-              </a:rPr>
-              <a:t> False</a:t>
-            </a:r>
-            <a:endParaRPr lang="en-US" dirty="0"/>
+              <a:t>Use conditionals to filter outliers from data</a:t>
+            </a:r>
+          </a:p>
+          <a:p>
+            <a:r>
+              <a:rPr lang="en-US" dirty="0"/>
+              <a:t>Use conditionals to label certain elements of data</a:t>
+            </a:r>
+          </a:p>
+          <a:p>
+            <a:pPr lvl="1"/>
+            <a:r>
+              <a:rPr lang="en-US" dirty="0"/>
+              <a:t>Volcano plot</a:t>
+            </a:r>
+          </a:p>
+          <a:p>
+            <a:r>
+              <a:rPr lang="en-US" dirty="0"/>
+              <a:t>Use function definition for filtering</a:t>
+            </a:r>
+          </a:p>
+          <a:p>
+            <a:pPr lvl="1"/>
+            <a:r>
+              <a:rPr lang="en-US" dirty="0"/>
+              <a:t>For plotting multiple samples</a:t>
+            </a:r>
           </a:p>
         </p:txBody>
       </p:sp>
     </p:spTree>
     <p:extLst>
       <p:ext uri="{BB962C8B-B14F-4D97-AF65-F5344CB8AC3E}">
-        <p14:creationId xmlns:p14="http://schemas.microsoft.com/office/powerpoint/2010/main" val="1075228923"/>
+        <p14:creationId xmlns:p14="http://schemas.microsoft.com/office/powerpoint/2010/main" val="14556711"/>
       </p:ext>
     </p:extLst>
   </p:cSld>
@@ -8038,118 +8520,6 @@
           <p:cNvPr id="2" name="Title 1">
             <a:extLst>
               <a:ext uri="{FF2B5EF4-FFF2-40B4-BE49-F238E27FC236}">
-                <a16:creationId xmlns:a16="http://schemas.microsoft.com/office/drawing/2014/main" id="{FEA057E2-7646-C813-10BE-88165D2E6CAF}"/>
-              </a:ext>
-            </a:extLst>
-          </p:cNvPr>
-          <p:cNvSpPr>
-            <a:spLocks noGrp="1"/>
-          </p:cNvSpPr>
-          <p:nvPr>
-            <p:ph type="title"/>
-          </p:nvPr>
-        </p:nvSpPr>
-        <p:spPr/>
-        <p:txBody>
-          <a:bodyPr/>
-          <a:lstStyle/>
-          <a:p>
-            <a:r>
-              <a:rPr lang="en-US" dirty="0"/>
-              <a:t>1.5 - Filtering</a:t>
-            </a:r>
-          </a:p>
-        </p:txBody>
-      </p:sp>
-      <p:sp>
-        <p:nvSpPr>
-          <p:cNvPr id="4" name="Content Placeholder 3">
-            <a:extLst>
-              <a:ext uri="{FF2B5EF4-FFF2-40B4-BE49-F238E27FC236}">
-                <a16:creationId xmlns:a16="http://schemas.microsoft.com/office/drawing/2014/main" id="{F4B24BAC-E46D-484A-A74A-8F7DF6CBA844}"/>
-              </a:ext>
-            </a:extLst>
-          </p:cNvPr>
-          <p:cNvSpPr>
-            <a:spLocks noGrp="1"/>
-          </p:cNvSpPr>
-          <p:nvPr>
-            <p:ph idx="1"/>
-          </p:nvPr>
-        </p:nvSpPr>
-        <p:spPr/>
-        <p:txBody>
-          <a:bodyPr/>
-          <a:lstStyle/>
-          <a:p>
-            <a:r>
-              <a:rPr lang="en-US" dirty="0"/>
-              <a:t>Use conditionals to filter outliers from data</a:t>
-            </a:r>
-          </a:p>
-          <a:p>
-            <a:r>
-              <a:rPr lang="en-US" dirty="0"/>
-              <a:t>Use conditionals to label certain elements of data</a:t>
-            </a:r>
-          </a:p>
-          <a:p>
-            <a:pPr lvl="1"/>
-            <a:r>
-              <a:rPr lang="en-US" dirty="0"/>
-              <a:t>Volcano plot</a:t>
-            </a:r>
-          </a:p>
-          <a:p>
-            <a:r>
-              <a:rPr lang="en-US" dirty="0"/>
-              <a:t>Use function definition for filtering</a:t>
-            </a:r>
-          </a:p>
-          <a:p>
-            <a:pPr lvl="1"/>
-            <a:r>
-              <a:rPr lang="en-US" dirty="0"/>
-              <a:t>For plotting multiple samples</a:t>
-            </a:r>
-          </a:p>
-        </p:txBody>
-      </p:sp>
-    </p:spTree>
-    <p:extLst>
-      <p:ext uri="{BB962C8B-B14F-4D97-AF65-F5344CB8AC3E}">
-        <p14:creationId xmlns:p14="http://schemas.microsoft.com/office/powerpoint/2010/main" val="14556711"/>
-      </p:ext>
-    </p:extLst>
-  </p:cSld>
-  <p:clrMapOvr>
-    <a:masterClrMapping/>
-  </p:clrMapOvr>
-</p:sld>
-</file>
-
-<file path=ppt/slides/slide22.xml><?xml version="1.0" encoding="utf-8"?>
-<p:sld xmlns:a="http://schemas.openxmlformats.org/drawingml/2006/main" xmlns:r="http://schemas.openxmlformats.org/officeDocument/2006/relationships" xmlns:p="http://schemas.openxmlformats.org/presentationml/2006/main">
-  <p:cSld>
-    <p:spTree>
-      <p:nvGrpSpPr>
-        <p:cNvPr id="1" name=""/>
-        <p:cNvGrpSpPr/>
-        <p:nvPr/>
-      </p:nvGrpSpPr>
-      <p:grpSpPr>
-        <a:xfrm>
-          <a:off x="0" y="0"/>
-          <a:ext cx="0" cy="0"/>
-          <a:chOff x="0" y="0"/>
-          <a:chExt cx="0" cy="0"/>
-        </a:xfrm>
-      </p:grpSpPr>
-      <p:sp>
-        <p:nvSpPr>
-          <p:cNvPr id="2" name="Title 1">
-            <a:extLst>
-              <a:ext uri="{FF2B5EF4-FFF2-40B4-BE49-F238E27FC236}">
                 <a16:creationId xmlns:a16="http://schemas.microsoft.com/office/drawing/2014/main" id="{7C682E81-4F21-9FB6-17B0-A0B4D9812482}"/>
               </a:ext>
             </a:extLst>
@@ -8263,7 +8633,7 @@
 </p:sld>
 </file>
 
-<file path=ppt/slides/slide23.xml><?xml version="1.0" encoding="utf-8"?>
+<file path=ppt/slides/slide22.xml><?xml version="1.0" encoding="utf-8"?>
 <p:sld xmlns:a="http://schemas.openxmlformats.org/drawingml/2006/main" xmlns:r="http://schemas.openxmlformats.org/officeDocument/2006/relationships" xmlns:p="http://schemas.openxmlformats.org/presentationml/2006/main">
   <p:cSld>
     <p:spTree>
@@ -8420,7 +8790,7 @@
           <a:p>
             <a:r>
               <a:rPr lang="en-US" dirty="0"/>
-              <a:t>1.1 - Motivation</a:t>
+              <a:t>Motivation</a:t>
             </a:r>
           </a:p>
         </p:txBody>
@@ -8611,6 +8981,49 @@
           </a:extLst>
         </p:spPr>
       </p:pic>
+      <p:sp>
+        <p:nvSpPr>
+          <p:cNvPr id="4" name="TextBox 3">
+            <a:extLst>
+              <a:ext uri="{FF2B5EF4-FFF2-40B4-BE49-F238E27FC236}">
+                <a16:creationId xmlns:a16="http://schemas.microsoft.com/office/drawing/2014/main" id="{7ECBB937-1501-9815-D375-B3CFB205F1A2}"/>
+              </a:ext>
+            </a:extLst>
+          </p:cNvPr>
+          <p:cNvSpPr txBox="1"/>
+          <p:nvPr/>
+        </p:nvSpPr>
+        <p:spPr>
+          <a:xfrm>
+            <a:off x="5949162" y="5590306"/>
+            <a:ext cx="3961951" cy="954107"/>
+          </a:xfrm>
+          <a:prstGeom prst="rect">
+            <a:avLst/>
+          </a:prstGeom>
+          <a:noFill/>
+        </p:spPr>
+        <p:txBody>
+          <a:bodyPr wrap="square">
+            <a:spAutoFit/>
+          </a:bodyPr>
+          <a:lstStyle/>
+          <a:p>
+            <a:r>
+              <a:rPr lang="en-US" sz="2800" dirty="0"/>
+              <a:t>What do </a:t>
+            </a:r>
+            <a:r>
+              <a:rPr lang="en-US" sz="2800" b="1" dirty="0"/>
+              <a:t>you</a:t>
+            </a:r>
+            <a:r>
+              <a:rPr lang="en-US" sz="2800" dirty="0"/>
+              <a:t> use programming for?</a:t>
+            </a:r>
+          </a:p>
+        </p:txBody>
+      </p:sp>
     </p:spTree>
     <p:extLst>
       <p:ext uri="{BB962C8B-B14F-4D97-AF65-F5344CB8AC3E}">
@@ -8764,6 +9177,51 @@
                       </p:childTnLst>
                     </p:cTn>
                   </p:par>
+                  <p:par>
+                    <p:cTn id="15" fill="hold">
+                      <p:stCondLst>
+                        <p:cond delay="indefinite"/>
+                      </p:stCondLst>
+                      <p:childTnLst>
+                        <p:par>
+                          <p:cTn id="16" fill="hold">
+                            <p:stCondLst>
+                              <p:cond delay="0"/>
+                            </p:stCondLst>
+                            <p:childTnLst>
+                              <p:par>
+                                <p:cTn id="17" presetID="1" presetClass="entr" presetSubtype="0" fill="hold" grpId="0" nodeType="clickEffect">
+                                  <p:stCondLst>
+                                    <p:cond delay="0"/>
+                                  </p:stCondLst>
+                                  <p:childTnLst>
+                                    <p:set>
+                                      <p:cBhvr>
+                                        <p:cTn id="18" dur="1" fill="hold">
+                                          <p:stCondLst>
+                                            <p:cond delay="0"/>
+                                          </p:stCondLst>
+                                        </p:cTn>
+                                        <p:tgtEl>
+                                          <p:spTgt spid="4"/>
+                                        </p:tgtEl>
+                                        <p:attrNameLst>
+                                          <p:attrName>style.visibility</p:attrName>
+                                        </p:attrNameLst>
+                                      </p:cBhvr>
+                                      <p:to>
+                                        <p:strVal val="visible"/>
+                                      </p:to>
+                                    </p:set>
+                                  </p:childTnLst>
+                                </p:cTn>
+                              </p:par>
+                            </p:childTnLst>
+                          </p:cTn>
+                        </p:par>
+                      </p:childTnLst>
+                    </p:cTn>
+                  </p:par>
                 </p:childTnLst>
               </p:cTn>
               <p:prevCondLst>
@@ -8785,6 +9243,9 @@
         </p:cTn>
       </p:par>
     </p:tnLst>
+    <p:bldLst>
+      <p:bldP spid="4" grpId="0"/>
+    </p:bldLst>
   </p:timing>
 </p:sld>
 </file>
@@ -8829,8 +9290,13 @@
           <a:p>
             <a:r>
               <a:rPr lang="en-US" dirty="0"/>
-              <a:t>1.2 - Python is…</a:t>
-            </a:r>
+              <a:t>Python is a </a:t>
+            </a:r>
+            <a:r>
+              <a:rPr lang="en-US" u="sng" dirty="0"/>
+              <a:t>language</a:t>
+            </a:r>
+            <a:endParaRPr lang="en-US" dirty="0"/>
           </a:p>
         </p:txBody>
       </p:sp>
@@ -9081,7 +9547,11 @@
           <a:p>
             <a:r>
               <a:rPr lang="en-US" dirty="0"/>
-              <a:t>1.2 - Python is…</a:t>
+              <a:t>Python is a </a:t>
+            </a:r>
+            <a:r>
+              <a:rPr lang="en-US" u="sng" dirty="0"/>
+              <a:t>language</a:t>
             </a:r>
           </a:p>
         </p:txBody>
@@ -9512,6 +9982,47 @@
           </a:p>
         </p:txBody>
       </p:sp>
+      <p:sp>
+        <p:nvSpPr>
+          <p:cNvPr id="7" name="TextBox 6">
+            <a:extLst>
+              <a:ext uri="{FF2B5EF4-FFF2-40B4-BE49-F238E27FC236}">
+                <a16:creationId xmlns:a16="http://schemas.microsoft.com/office/drawing/2014/main" id="{B0793203-840D-E5A7-AF56-876C02DEDCC8}"/>
+              </a:ext>
+            </a:extLst>
+          </p:cNvPr>
+          <p:cNvSpPr txBox="1"/>
+          <p:nvPr/>
+        </p:nvSpPr>
+        <p:spPr>
+          <a:xfrm>
+            <a:off x="5573550" y="5889262"/>
+            <a:ext cx="3105594" cy="646331"/>
+          </a:xfrm>
+          <a:prstGeom prst="rect">
+            <a:avLst/>
+          </a:prstGeom>
+          <a:noFill/>
+        </p:spPr>
+        <p:txBody>
+          <a:bodyPr wrap="none" rtlCol="0">
+            <a:spAutoFit/>
+          </a:bodyPr>
+          <a:lstStyle/>
+          <a:p>
+            <a:r>
+              <a:rPr lang="en-US" dirty="0"/>
+              <a:t>+ easy to pick up</a:t>
+            </a:r>
+          </a:p>
+          <a:p>
+            <a:r>
+              <a:rPr lang="en-US" dirty="0"/>
+              <a:t>- slower than other languages</a:t>
+            </a:r>
+          </a:p>
+        </p:txBody>
+      </p:sp>
     </p:spTree>
     <p:extLst>
       <p:ext uri="{BB962C8B-B14F-4D97-AF65-F5344CB8AC3E}">
@@ -9522,6 +10033,84 @@
   <p:clrMapOvr>
     <a:masterClrMapping/>
   </p:clrMapOvr>
+  <p:timing>
+    <p:tnLst>
+      <p:par>
+        <p:cTn id="1" dur="indefinite" restart="never" nodeType="tmRoot">
+          <p:childTnLst>
+            <p:seq concurrent="1" nextAc="seek">
+              <p:cTn id="2" dur="indefinite" nodeType="mainSeq">
+                <p:childTnLst>
+                  <p:par>
+                    <p:cTn id="3" fill="hold">
+                      <p:stCondLst>
+                        <p:cond delay="indefinite"/>
+                      </p:stCondLst>
+                      <p:childTnLst>
+                        <p:par>
+                          <p:cTn id="4" fill="hold">
+                            <p:stCondLst>
+                              <p:cond delay="0"/>
+                            </p:stCondLst>
+                            <p:childTnLst>
+                              <p:par>
+                                <p:cTn id="5" presetID="1" presetClass="entr" presetSubtype="0" fill="hold" grpId="0" nodeType="clickEffect">
+                                  <p:stCondLst>
+                                    <p:cond delay="0"/>
+                                  </p:stCondLst>
+                                  <p:childTnLst>
+                                    <p:set>
+                                      <p:cBhvr>
+                                        <p:cTn id="6" dur="1" fill="hold">
+                                          <p:stCondLst>
+                                            <p:cond delay="0"/>
+                                          </p:stCondLst>
+                                        </p:cTn>
+                                        <p:tgtEl>
+                                          <p:spTgt spid="7"/>
+                                        </p:tgtEl>
+                                        <p:attrNameLst>
+                                          <p:attrName>style.visibility</p:attrName>
+                                        </p:attrNameLst>
+                                      </p:cBhvr>
+                                      <p:to>
+                                        <p:strVal val="visible"/>
+                                      </p:to>
+                                    </p:set>
+                                  </p:childTnLst>
+                                </p:cTn>
+                              </p:par>
+                            </p:childTnLst>
+                          </p:cTn>
+                        </p:par>
+                      </p:childTnLst>
+                    </p:cTn>
+                  </p:par>
+                </p:childTnLst>
+              </p:cTn>
+              <p:prevCondLst>
+                <p:cond evt="onPrev" delay="0">
+                  <p:tgtEl>
+                    <p:sldTgt/>
+                  </p:tgtEl>
+                </p:cond>
+              </p:prevCondLst>
+              <p:nextCondLst>
+                <p:cond evt="onNext" delay="0">
+                  <p:tgtEl>
+                    <p:sldTgt/>
+                  </p:tgtEl>
+                </p:cond>
+              </p:nextCondLst>
+            </p:seq>
+          </p:childTnLst>
+        </p:cTn>
+      </p:par>
+    </p:tnLst>
+    <p:bldLst>
+      <p:bldP spid="7" grpId="0"/>
+    </p:bldLst>
+  </p:timing>
 </p:sld>
 </file>
 
@@ -9565,7 +10154,7 @@
           <a:p>
             <a:r>
               <a:rPr lang="en-US" dirty="0"/>
-              <a:t>1.2 - Python is…</a:t>
+              <a:t>Let’s try Python!</a:t>
             </a:r>
           </a:p>
         </p:txBody>
@@ -9596,16 +10185,6 @@
                 <a:hlinkClick r:id="rId2"/>
               </a:rPr>
               <a:t>Colab link</a:t>
-            </a:r>
-            <a:r>
-              <a:rPr lang="en-US" dirty="0"/>
-              <a:t> </a:t>
-            </a:r>
-            <a:r>
-              <a:rPr lang="en-US" dirty="0">
-                <a:sym typeface="Wingdings" pitchFamily="2" charset="2"/>
-              </a:rPr>
-              <a:t> make a copy of this notebook</a:t>
             </a:r>
             <a:endParaRPr lang="en-US" dirty="0"/>
           </a:p>
@@ -9675,7 +10254,7 @@
           <p:cNvPr id="2" name="Title 1">
             <a:extLst>
               <a:ext uri="{FF2B5EF4-FFF2-40B4-BE49-F238E27FC236}">
-                <a16:creationId xmlns:a16="http://schemas.microsoft.com/office/drawing/2014/main" id="{CD53320A-FE3A-4028-1FD9-C103122EF49D}"/>
+                <a16:creationId xmlns:a16="http://schemas.microsoft.com/office/drawing/2014/main" id="{4F531A64-1948-2E3E-1D16-25998D929C65}"/>
               </a:ext>
             </a:extLst>
           </p:cNvPr>
@@ -9693,62 +10272,17 @@
           <a:p>
             <a:r>
               <a:rPr lang="en-US" dirty="0"/>
-              <a:t>Our First Bug!</a:t>
-            </a:r>
-          </a:p>
-        </p:txBody>
-      </p:sp>
-      <p:sp>
-        <p:nvSpPr>
-          <p:cNvPr id="6" name="Content Placeholder 5">
-            <a:extLst>
-              <a:ext uri="{FF2B5EF4-FFF2-40B4-BE49-F238E27FC236}">
-                <a16:creationId xmlns:a16="http://schemas.microsoft.com/office/drawing/2014/main" id="{2E2A2457-D812-ED48-A179-2FF0F22C771B}"/>
-              </a:ext>
-            </a:extLst>
-          </p:cNvPr>
-          <p:cNvSpPr>
-            <a:spLocks noGrp="1"/>
-          </p:cNvSpPr>
-          <p:nvPr>
-            <p:ph idx="1"/>
-          </p:nvPr>
-        </p:nvSpPr>
-        <p:spPr>
-          <a:xfrm>
-            <a:off x="838200" y="4425043"/>
-            <a:ext cx="10515600" cy="1751920"/>
-          </a:xfrm>
-        </p:spPr>
-        <p:txBody>
-          <a:bodyPr/>
-          <a:lstStyle/>
-          <a:p>
-            <a:r>
-              <a:rPr lang="en-US" dirty="0"/>
-              <a:t>Python reads top to bottom, left to right</a:t>
-            </a:r>
-          </a:p>
-          <a:p>
-            <a:r>
-              <a:rPr lang="en-US" dirty="0"/>
-              <a:t>Python understands [print()]</a:t>
-            </a:r>
-          </a:p>
-          <a:p>
-            <a:r>
-              <a:rPr lang="en-US" dirty="0"/>
-              <a:t>Python does not understand [Hello]</a:t>
+              <a:t>Variables</a:t>
             </a:r>
           </a:p>
         </p:txBody>
       </p:sp>
       <p:pic>
         <p:nvPicPr>
-          <p:cNvPr id="7" name="Content Placeholder 3" descr="A computer code with text&#10;&#10;Description automatically generated with medium confidence">
-            <a:extLst>
-              <a:ext uri="{FF2B5EF4-FFF2-40B4-BE49-F238E27FC236}">
-                <a16:creationId xmlns:a16="http://schemas.microsoft.com/office/drawing/2014/main" id="{D7D5BF1E-3957-3355-3DB1-9A5025CEFD5D}"/>
+          <p:cNvPr id="7" name="Picture 6" descr="A close-up of a white background&#10;&#10;Description automatically generated">
+            <a:extLst>
+              <a:ext uri="{FF2B5EF4-FFF2-40B4-BE49-F238E27FC236}">
+                <a16:creationId xmlns:a16="http://schemas.microsoft.com/office/drawing/2014/main" id="{D278E535-C2F8-3D78-6276-F7D0B111DDA3}"/>
               </a:ext>
             </a:extLst>
           </p:cNvPr>
@@ -9765,18 +10299,51 @@
         </p:blipFill>
         <p:spPr>
           <a:xfrm>
-            <a:off x="410667" y="1539024"/>
-            <a:ext cx="11370665" cy="2546463"/>
+            <a:off x="2028939" y="2081893"/>
+            <a:ext cx="8134121" cy="2694213"/>
           </a:xfrm>
           <a:prstGeom prst="rect">
             <a:avLst/>
           </a:prstGeom>
         </p:spPr>
       </p:pic>
+      <p:sp>
+        <p:nvSpPr>
+          <p:cNvPr id="10" name="Content Placeholder 2">
+            <a:extLst>
+              <a:ext uri="{FF2B5EF4-FFF2-40B4-BE49-F238E27FC236}">
+                <a16:creationId xmlns:a16="http://schemas.microsoft.com/office/drawing/2014/main" id="{41ED2A20-E678-EC49-446B-B1F02D7594E5}"/>
+              </a:ext>
+            </a:extLst>
+          </p:cNvPr>
+          <p:cNvSpPr>
+            <a:spLocks noGrp="1"/>
+          </p:cNvSpPr>
+          <p:nvPr>
+            <p:ph idx="1"/>
+          </p:nvPr>
+        </p:nvSpPr>
+        <p:spPr>
+          <a:xfrm>
+            <a:off x="838200" y="5551713"/>
+            <a:ext cx="10515600" cy="625249"/>
+          </a:xfrm>
+        </p:spPr>
+        <p:txBody>
+          <a:bodyPr/>
+          <a:lstStyle/>
+          <a:p>
+            <a:r>
+              <a:rPr lang="en-US" dirty="0"/>
+              <a:t>Now we can fix our bug!</a:t>
+            </a:r>
+          </a:p>
+        </p:txBody>
+      </p:sp>
     </p:spTree>
     <p:extLst>
       <p:ext uri="{BB962C8B-B14F-4D97-AF65-F5344CB8AC3E}">
-        <p14:creationId xmlns:p14="http://schemas.microsoft.com/office/powerpoint/2010/main" val="2317027026"/>
+        <p14:creationId xmlns:p14="http://schemas.microsoft.com/office/powerpoint/2010/main" val="1127581319"/>
       </p:ext>
     </p:extLst>
   </p:cSld>
@@ -9826,78 +10393,43 @@
           <a:p>
             <a:r>
               <a:rPr lang="en-US" dirty="0"/>
-              <a:t>1.3 - Variables</a:t>
+              <a:t>Operators</a:t>
             </a:r>
           </a:p>
         </p:txBody>
       </p:sp>
       <p:pic>
         <p:nvPicPr>
-          <p:cNvPr id="7" name="Picture 6" descr="A close-up of a white background&#10;&#10;Description automatically generated">
-            <a:extLst>
-              <a:ext uri="{FF2B5EF4-FFF2-40B4-BE49-F238E27FC236}">
-                <a16:creationId xmlns:a16="http://schemas.microsoft.com/office/drawing/2014/main" id="{D278E535-C2F8-3D78-6276-F7D0B111DDA3}"/>
+          <p:cNvPr id="7" name="Content Placeholder 6" descr="A white sheet with text and numbers&#10;&#10;Description automatically generated with medium confidence">
+            <a:extLst>
+              <a:ext uri="{FF2B5EF4-FFF2-40B4-BE49-F238E27FC236}">
+                <a16:creationId xmlns:a16="http://schemas.microsoft.com/office/drawing/2014/main" id="{A4B913A6-A2A7-6A72-3E82-993B94BB3DF4}"/>
               </a:ext>
             </a:extLst>
           </p:cNvPr>
           <p:cNvPicPr>
-            <a:picLocks noChangeAspect="1"/>
+            <a:picLocks noGrp="1" noChangeAspect="1"/>
           </p:cNvPicPr>
-          <p:nvPr/>
+          <p:nvPr>
+            <p:ph idx="1"/>
+          </p:nvPr>
         </p:nvPicPr>
-        <p:blipFill>
-          <a:blip r:embed="rId2"/>
-          <a:stretch>
-            <a:fillRect/>
-          </a:stretch>
+        <p:blipFill rotWithShape="1">
+          <a:blip r:embed="rId3"/>
+          <a:srcRect t="-1" b="39947"/>
+          <a:stretch/>
         </p:blipFill>
         <p:spPr>
           <a:xfrm>
-            <a:off x="2028939" y="2081893"/>
-            <a:ext cx="8134121" cy="2694213"/>
+            <a:off x="1260542" y="2054847"/>
+            <a:ext cx="9670915" cy="3196375"/>
           </a:xfrm>
-          <a:prstGeom prst="rect">
-            <a:avLst/>
-          </a:prstGeom>
         </p:spPr>
       </p:pic>
-      <p:sp>
-        <p:nvSpPr>
-          <p:cNvPr id="10" name="Content Placeholder 2">
-            <a:extLst>
-              <a:ext uri="{FF2B5EF4-FFF2-40B4-BE49-F238E27FC236}">
-                <a16:creationId xmlns:a16="http://schemas.microsoft.com/office/drawing/2014/main" id="{41ED2A20-E678-EC49-446B-B1F02D7594E5}"/>
-              </a:ext>
-            </a:extLst>
-          </p:cNvPr>
-          <p:cNvSpPr>
-            <a:spLocks noGrp="1"/>
-          </p:cNvSpPr>
-          <p:nvPr>
-            <p:ph idx="1"/>
-          </p:nvPr>
-        </p:nvSpPr>
-        <p:spPr>
-          <a:xfrm>
-            <a:off x="838200" y="5551713"/>
-            <a:ext cx="10515600" cy="625249"/>
-          </a:xfrm>
-        </p:spPr>
-        <p:txBody>
-          <a:bodyPr/>
-          <a:lstStyle/>
-          <a:p>
-            <a:r>
-              <a:rPr lang="en-US" dirty="0"/>
-              <a:t>Now we can fix our bug!</a:t>
-            </a:r>
-          </a:p>
-        </p:txBody>
-      </p:sp>
     </p:spTree>
     <p:extLst>
       <p:ext uri="{BB962C8B-B14F-4D97-AF65-F5344CB8AC3E}">
-        <p14:creationId xmlns:p14="http://schemas.microsoft.com/office/powerpoint/2010/main" val="1127581319"/>
+        <p14:creationId xmlns:p14="http://schemas.microsoft.com/office/powerpoint/2010/main" val="1314934975"/>
       </p:ext>
     </p:extLst>
   </p:cSld>
@@ -9947,17 +10479,17 @@
           <a:p>
             <a:r>
               <a:rPr lang="en-US" dirty="0"/>
-              <a:t>1.3 - Operators</a:t>
+              <a:t>Functions</a:t>
             </a:r>
           </a:p>
         </p:txBody>
       </p:sp>
       <p:pic>
         <p:nvPicPr>
-          <p:cNvPr id="7" name="Content Placeholder 6" descr="A white sheet with text and numbers&#10;&#10;Description automatically generated with medium confidence">
-            <a:extLst>
-              <a:ext uri="{FF2B5EF4-FFF2-40B4-BE49-F238E27FC236}">
-                <a16:creationId xmlns:a16="http://schemas.microsoft.com/office/drawing/2014/main" id="{A4B913A6-A2A7-6A72-3E82-993B94BB3DF4}"/>
+          <p:cNvPr id="5" name="Content Placeholder 4" descr="A screenshot of a computer program&#10;&#10;Description automatically generated">
+            <a:extLst>
+              <a:ext uri="{FF2B5EF4-FFF2-40B4-BE49-F238E27FC236}">
+                <a16:creationId xmlns:a16="http://schemas.microsoft.com/office/drawing/2014/main" id="{70F361B7-28C9-6975-CEF8-51A8FEFDFB35}"/>
               </a:ext>
             </a:extLst>
           </p:cNvPr>
@@ -9969,21 +10501,56 @@
           </p:nvPr>
         </p:nvPicPr>
         <p:blipFill rotWithShape="1">
-          <a:blip r:embed="rId2"/>
-          <a:srcRect t="-1" b="39947"/>
+          <a:blip r:embed="rId3"/>
+          <a:srcRect b="28629"/>
           <a:stretch/>
         </p:blipFill>
         <p:spPr>
           <a:xfrm>
-            <a:off x="1260542" y="2054847"/>
-            <a:ext cx="9670915" cy="3196375"/>
+            <a:off x="1204598" y="1836007"/>
+            <a:ext cx="9782803" cy="4037969"/>
           </a:xfrm>
         </p:spPr>
       </p:pic>
+      <p:sp>
+        <p:nvSpPr>
+          <p:cNvPr id="3" name="TextBox 2">
+            <a:extLst>
+              <a:ext uri="{FF2B5EF4-FFF2-40B4-BE49-F238E27FC236}">
+                <a16:creationId xmlns:a16="http://schemas.microsoft.com/office/drawing/2014/main" id="{7D5168B7-D047-74B7-622A-48E1CC3A3E36}"/>
+              </a:ext>
+            </a:extLst>
+          </p:cNvPr>
+          <p:cNvSpPr txBox="1"/>
+          <p:nvPr/>
+        </p:nvSpPr>
+        <p:spPr>
+          <a:xfrm>
+            <a:off x="2596242" y="6019295"/>
+            <a:ext cx="4698274" cy="369332"/>
+          </a:xfrm>
+          <a:prstGeom prst="rect">
+            <a:avLst/>
+          </a:prstGeom>
+          <a:noFill/>
+        </p:spPr>
+        <p:txBody>
+          <a:bodyPr wrap="none" rtlCol="0">
+            <a:spAutoFit/>
+          </a:bodyPr>
+          <a:lstStyle/>
+          <a:p>
+            <a:r>
+              <a:rPr lang="en-US" dirty="0"/>
+              <a:t>Can you predict what this line of code will do?</a:t>
+            </a:r>
+          </a:p>
+        </p:txBody>
+      </p:sp>
     </p:spTree>
     <p:extLst>
       <p:ext uri="{BB962C8B-B14F-4D97-AF65-F5344CB8AC3E}">
-        <p14:creationId xmlns:p14="http://schemas.microsoft.com/office/powerpoint/2010/main" val="1314934975"/>
+        <p14:creationId xmlns:p14="http://schemas.microsoft.com/office/powerpoint/2010/main" val="3637622105"/>
       </p:ext>
     </p:extLst>
   </p:cSld>

</xml_diff>